<commit_message>
add new doc; add new test for simulator
</commit_message>
<xml_diff>
--- a/doc/SoftwareDesign/AdaptiveSystem/AdaptiveSystemDesign.pptx
+++ b/doc/SoftwareDesign/AdaptiveSystem/AdaptiveSystemDesign.pptx
@@ -6,8 +6,12 @@
   </p:sldMasterIdLst>
   <p:sldIdLst>
     <p:sldId id="256" r:id="rId2"/>
-    <p:sldId id="257" r:id="rId3"/>
-    <p:sldId id="258" r:id="rId4"/>
+    <p:sldId id="259" r:id="rId3"/>
+    <p:sldId id="260" r:id="rId4"/>
+    <p:sldId id="257" r:id="rId5"/>
+    <p:sldId id="258" r:id="rId6"/>
+    <p:sldId id="261" r:id="rId7"/>
+    <p:sldId id="262" r:id="rId8"/>
   </p:sldIdLst>
   <p:sldSz cx="12192000" cy="6858000"/>
   <p:notesSz cx="6858000" cy="9144000"/>
@@ -261,7 +265,7 @@
           <a:p>
             <a:fld id="{C64A47DC-23B0-47B4-A278-C88751767FBE}" type="datetimeFigureOut">
               <a:rPr lang="zh-CN" altLang="en-US" smtClean="0"/>
-              <a:t>2020/10/23</a:t>
+              <a:t>2021/01/24</a:t>
             </a:fld>
             <a:endParaRPr lang="zh-CN" altLang="en-US"/>
           </a:p>
@@ -459,7 +463,7 @@
           <a:p>
             <a:fld id="{C64A47DC-23B0-47B4-A278-C88751767FBE}" type="datetimeFigureOut">
               <a:rPr lang="zh-CN" altLang="en-US" smtClean="0"/>
-              <a:t>2020/10/23</a:t>
+              <a:t>2021/01/24</a:t>
             </a:fld>
             <a:endParaRPr lang="zh-CN" altLang="en-US"/>
           </a:p>
@@ -667,7 +671,7 @@
           <a:p>
             <a:fld id="{C64A47DC-23B0-47B4-A278-C88751767FBE}" type="datetimeFigureOut">
               <a:rPr lang="zh-CN" altLang="en-US" smtClean="0"/>
-              <a:t>2020/10/23</a:t>
+              <a:t>2021/01/24</a:t>
             </a:fld>
             <a:endParaRPr lang="zh-CN" altLang="en-US"/>
           </a:p>
@@ -865,7 +869,7 @@
           <a:p>
             <a:fld id="{C64A47DC-23B0-47B4-A278-C88751767FBE}" type="datetimeFigureOut">
               <a:rPr lang="zh-CN" altLang="en-US" smtClean="0"/>
-              <a:t>2020/10/23</a:t>
+              <a:t>2021/01/24</a:t>
             </a:fld>
             <a:endParaRPr lang="zh-CN" altLang="en-US"/>
           </a:p>
@@ -1140,7 +1144,7 @@
           <a:p>
             <a:fld id="{C64A47DC-23B0-47B4-A278-C88751767FBE}" type="datetimeFigureOut">
               <a:rPr lang="zh-CN" altLang="en-US" smtClean="0"/>
-              <a:t>2020/10/23</a:t>
+              <a:t>2021/01/24</a:t>
             </a:fld>
             <a:endParaRPr lang="zh-CN" altLang="en-US"/>
           </a:p>
@@ -1405,7 +1409,7 @@
           <a:p>
             <a:fld id="{C64A47DC-23B0-47B4-A278-C88751767FBE}" type="datetimeFigureOut">
               <a:rPr lang="zh-CN" altLang="en-US" smtClean="0"/>
-              <a:t>2020/10/23</a:t>
+              <a:t>2021/01/24</a:t>
             </a:fld>
             <a:endParaRPr lang="zh-CN" altLang="en-US"/>
           </a:p>
@@ -1817,7 +1821,7 @@
           <a:p>
             <a:fld id="{C64A47DC-23B0-47B4-A278-C88751767FBE}" type="datetimeFigureOut">
               <a:rPr lang="zh-CN" altLang="en-US" smtClean="0"/>
-              <a:t>2020/10/23</a:t>
+              <a:t>2021/01/24</a:t>
             </a:fld>
             <a:endParaRPr lang="zh-CN" altLang="en-US"/>
           </a:p>
@@ -1958,7 +1962,7 @@
           <a:p>
             <a:fld id="{C64A47DC-23B0-47B4-A278-C88751767FBE}" type="datetimeFigureOut">
               <a:rPr lang="zh-CN" altLang="en-US" smtClean="0"/>
-              <a:t>2020/10/23</a:t>
+              <a:t>2021/01/24</a:t>
             </a:fld>
             <a:endParaRPr lang="zh-CN" altLang="en-US"/>
           </a:p>
@@ -2071,7 +2075,7 @@
           <a:p>
             <a:fld id="{C64A47DC-23B0-47B4-A278-C88751767FBE}" type="datetimeFigureOut">
               <a:rPr lang="zh-CN" altLang="en-US" smtClean="0"/>
-              <a:t>2020/10/23</a:t>
+              <a:t>2021/01/24</a:t>
             </a:fld>
             <a:endParaRPr lang="zh-CN" altLang="en-US"/>
           </a:p>
@@ -2382,7 +2386,7 @@
           <a:p>
             <a:fld id="{C64A47DC-23B0-47B4-A278-C88751767FBE}" type="datetimeFigureOut">
               <a:rPr lang="zh-CN" altLang="en-US" smtClean="0"/>
-              <a:t>2020/10/23</a:t>
+              <a:t>2021/01/24</a:t>
             </a:fld>
             <a:endParaRPr lang="zh-CN" altLang="en-US"/>
           </a:p>
@@ -2670,7 +2674,7 @@
           <a:p>
             <a:fld id="{C64A47DC-23B0-47B4-A278-C88751767FBE}" type="datetimeFigureOut">
               <a:rPr lang="zh-CN" altLang="en-US" smtClean="0"/>
-              <a:t>2020/10/23</a:t>
+              <a:t>2021/01/24</a:t>
             </a:fld>
             <a:endParaRPr lang="zh-CN" altLang="en-US"/>
           </a:p>
@@ -2911,7 +2915,7 @@
           <a:p>
             <a:fld id="{C64A47DC-23B0-47B4-A278-C88751767FBE}" type="datetimeFigureOut">
               <a:rPr lang="zh-CN" altLang="en-US" smtClean="0"/>
-              <a:t>2020/10/23</a:t>
+              <a:t>2021/01/24</a:t>
             </a:fld>
             <a:endParaRPr lang="zh-CN" altLang="en-US"/>
           </a:p>
@@ -3424,7 +3428,7 @@
           <p:cNvPr id="2" name="标题 1">
             <a:extLst>
               <a:ext uri="{FF2B5EF4-FFF2-40B4-BE49-F238E27FC236}">
-                <a16:creationId xmlns:a16="http://schemas.microsoft.com/office/drawing/2014/main" id="{75FA18FA-C233-48A7-AF85-B2D1F5F89946}"/>
+                <a16:creationId xmlns:a16="http://schemas.microsoft.com/office/drawing/2014/main" id="{7DB7F36D-0885-4395-85E4-954F764AA2A8}"/>
               </a:ext>
             </a:extLst>
           </p:cNvPr>
@@ -3442,7 +3446,7 @@
           <a:p>
             <a:r>
               <a:rPr lang="en-US" altLang="zh-CN" dirty="0"/>
-              <a:t>SAM Design – Adaptive</a:t>
+              <a:t>Requirements</a:t>
             </a:r>
             <a:endParaRPr lang="zh-CN" altLang="en-US" dirty="0"/>
           </a:p>
@@ -3450,686 +3454,187 @@
       </p:sp>
       <p:sp>
         <p:nvSpPr>
-          <p:cNvPr id="4" name="矩形 3">
-            <a:extLst>
-              <a:ext uri="{FF2B5EF4-FFF2-40B4-BE49-F238E27FC236}">
-                <a16:creationId xmlns:a16="http://schemas.microsoft.com/office/drawing/2014/main" id="{4936DC08-1554-470C-A2BD-377C9EF887DD}"/>
-              </a:ext>
-            </a:extLst>
-          </p:cNvPr>
-          <p:cNvSpPr/>
-          <p:nvPr/>
+          <p:cNvPr id="3" name="内容占位符 2">
+            <a:extLst>
+              <a:ext uri="{FF2B5EF4-FFF2-40B4-BE49-F238E27FC236}">
+                <a16:creationId xmlns:a16="http://schemas.microsoft.com/office/drawing/2014/main" id="{714CDC03-4A0E-437F-A5BB-5FDCFD72BF33}"/>
+              </a:ext>
+            </a:extLst>
+          </p:cNvPr>
+          <p:cNvSpPr>
+            <a:spLocks noGrp="1"/>
+          </p:cNvSpPr>
+          <p:nvPr>
+            <p:ph idx="1"/>
+          </p:nvPr>
         </p:nvSpPr>
         <p:spPr>
           <a:xfrm>
-            <a:off x="844941" y="2661800"/>
-            <a:ext cx="10644326" cy="2700314"/>
+            <a:off x="838200" y="1825625"/>
+            <a:ext cx="10515600" cy="4801418"/>
           </a:xfrm>
-          <a:prstGeom prst="rect">
-            <a:avLst/>
-          </a:prstGeom>
         </p:spPr>
-        <p:style>
-          <a:lnRef idx="2">
-            <a:schemeClr val="accent6"/>
-          </a:lnRef>
-          <a:fillRef idx="1">
-            <a:schemeClr val="lt1"/>
-          </a:fillRef>
-          <a:effectRef idx="0">
-            <a:schemeClr val="accent6"/>
-          </a:effectRef>
-          <a:fontRef idx="minor">
-            <a:schemeClr val="dk1"/>
-          </a:fontRef>
-        </p:style>
-        <p:txBody>
-          <a:bodyPr rtlCol="0" anchor="ctr"/>
-          <a:lstStyle/>
-          <a:p>
-            <a:pPr algn="ctr"/>
-            <a:endParaRPr lang="zh-CN" altLang="en-US" dirty="0"/>
-          </a:p>
-        </p:txBody>
-      </p:sp>
-      <p:sp>
-        <p:nvSpPr>
-          <p:cNvPr id="5" name="矩形 4">
-            <a:extLst>
-              <a:ext uri="{FF2B5EF4-FFF2-40B4-BE49-F238E27FC236}">
-                <a16:creationId xmlns:a16="http://schemas.microsoft.com/office/drawing/2014/main" id="{D3D897B1-4F28-4913-9605-0F11B3D0EAD4}"/>
-              </a:ext>
-            </a:extLst>
-          </p:cNvPr>
-          <p:cNvSpPr/>
-          <p:nvPr/>
-        </p:nvSpPr>
-        <p:spPr>
-          <a:xfrm>
-            <a:off x="2762947" y="4238628"/>
-            <a:ext cx="2704971" cy="535762"/>
-          </a:xfrm>
-          <a:prstGeom prst="rect">
-            <a:avLst/>
-          </a:prstGeom>
-        </p:spPr>
-        <p:style>
-          <a:lnRef idx="2">
-            <a:schemeClr val="accent1">
-              <a:shade val="50000"/>
-            </a:schemeClr>
-          </a:lnRef>
-          <a:fillRef idx="1">
-            <a:schemeClr val="accent1"/>
-          </a:fillRef>
-          <a:effectRef idx="0">
-            <a:schemeClr val="accent1"/>
-          </a:effectRef>
-          <a:fontRef idx="minor">
-            <a:schemeClr val="lt1"/>
-          </a:fontRef>
-        </p:style>
-        <p:txBody>
-          <a:bodyPr rtlCol="0" anchor="ctr"/>
-          <a:lstStyle/>
-          <a:p>
-            <a:pPr algn="ctr"/>
+        <p:txBody>
+          <a:bodyPr>
+            <a:normAutofit/>
+          </a:bodyPr>
+          <a:lstStyle/>
+          <a:p>
+            <a:r>
+              <a:rPr lang="zh-CN" altLang="en-US" dirty="0"/>
+              <a:t>获取拓扑变化（被动），设备</a:t>
+            </a:r>
             <a:r>
               <a:rPr lang="en-US" altLang="zh-CN" dirty="0"/>
-              <a:t>Failure Alert processor </a:t>
-            </a:r>
-            <a:endParaRPr lang="zh-CN" altLang="en-US" dirty="0"/>
-          </a:p>
-        </p:txBody>
-      </p:sp>
-      <p:sp>
-        <p:nvSpPr>
-          <p:cNvPr id="7" name="文本框 6">
-            <a:extLst>
-              <a:ext uri="{FF2B5EF4-FFF2-40B4-BE49-F238E27FC236}">
-                <a16:creationId xmlns:a16="http://schemas.microsoft.com/office/drawing/2014/main" id="{23FC44CC-61B5-48F9-A828-E5266467FEDD}"/>
-              </a:ext>
-            </a:extLst>
-          </p:cNvPr>
-          <p:cNvSpPr txBox="1"/>
-          <p:nvPr/>
-        </p:nvSpPr>
-        <p:spPr>
-          <a:xfrm>
-            <a:off x="5902254" y="2290421"/>
-            <a:ext cx="1053494" cy="369332"/>
-          </a:xfrm>
-          <a:prstGeom prst="rect">
-            <a:avLst/>
-          </a:prstGeom>
-          <a:noFill/>
-        </p:spPr>
-        <p:txBody>
-          <a:bodyPr wrap="none" rtlCol="0">
-            <a:spAutoFit/>
-          </a:bodyPr>
-          <a:lstStyle/>
-          <a:p>
+              <a:t>/</a:t>
+            </a:r>
+            <a:r>
+              <a:rPr lang="zh-CN" altLang="en-US" dirty="0"/>
+              <a:t>流量异常（主动）信息：</a:t>
+            </a:r>
+            <a:endParaRPr lang="en-US" altLang="zh-CN" dirty="0"/>
+          </a:p>
+          <a:p>
+            <a:pPr lvl="1"/>
+            <a:r>
+              <a:rPr lang="zh-CN" altLang="en-US" dirty="0"/>
+              <a:t>向</a:t>
+            </a:r>
             <a:r>
               <a:rPr lang="en-US" altLang="zh-CN" dirty="0"/>
-              <a:t>message</a:t>
-            </a:r>
-            <a:endParaRPr lang="zh-CN" altLang="en-US" dirty="0"/>
-          </a:p>
-        </p:txBody>
-      </p:sp>
-      <p:sp>
-        <p:nvSpPr>
-          <p:cNvPr id="8" name="矩形 7">
-            <a:extLst>
-              <a:ext uri="{FF2B5EF4-FFF2-40B4-BE49-F238E27FC236}">
-                <a16:creationId xmlns:a16="http://schemas.microsoft.com/office/drawing/2014/main" id="{A6C2DB94-9DFA-4E47-A700-016BCB4BA960}"/>
-              </a:ext>
-            </a:extLst>
-          </p:cNvPr>
-          <p:cNvSpPr/>
-          <p:nvPr/>
-        </p:nvSpPr>
-        <p:spPr>
-          <a:xfrm>
-            <a:off x="4790603" y="3142724"/>
-            <a:ext cx="2007831" cy="535762"/>
-          </a:xfrm>
-          <a:prstGeom prst="rect">
-            <a:avLst/>
-          </a:prstGeom>
-        </p:spPr>
-        <p:style>
-          <a:lnRef idx="2">
-            <a:schemeClr val="accent1">
-              <a:shade val="50000"/>
-            </a:schemeClr>
-          </a:lnRef>
-          <a:fillRef idx="1">
-            <a:schemeClr val="accent1"/>
-          </a:fillRef>
-          <a:effectRef idx="0">
-            <a:schemeClr val="accent1"/>
-          </a:effectRef>
-          <a:fontRef idx="minor">
-            <a:schemeClr val="lt1"/>
-          </a:fontRef>
-        </p:style>
-        <p:txBody>
-          <a:bodyPr rtlCol="0" anchor="ctr"/>
-          <a:lstStyle/>
-          <a:p>
-            <a:pPr algn="ctr"/>
-            <a:r>
-              <a:rPr lang="en-US" altLang="zh-CN" dirty="0" err="1"/>
-              <a:t>MessageAgent</a:t>
-            </a:r>
-            <a:endParaRPr lang="zh-CN" altLang="en-US" dirty="0"/>
-          </a:p>
-        </p:txBody>
-      </p:sp>
-      <p:sp>
-        <p:nvSpPr>
-          <p:cNvPr id="6" name="箭头: 右 5">
-            <a:extLst>
-              <a:ext uri="{FF2B5EF4-FFF2-40B4-BE49-F238E27FC236}">
-                <a16:creationId xmlns:a16="http://schemas.microsoft.com/office/drawing/2014/main" id="{AFABD06F-FE3C-44CB-A355-AF185771326E}"/>
-              </a:ext>
-            </a:extLst>
-          </p:cNvPr>
-          <p:cNvSpPr/>
-          <p:nvPr/>
-        </p:nvSpPr>
-        <p:spPr>
-          <a:xfrm rot="5400000">
-            <a:off x="5457800" y="2522655"/>
-            <a:ext cx="673434" cy="470517"/>
-          </a:xfrm>
-          <a:prstGeom prst="rightArrow">
-            <a:avLst/>
-          </a:prstGeom>
-        </p:spPr>
-        <p:style>
-          <a:lnRef idx="2">
-            <a:schemeClr val="accent2">
-              <a:shade val="50000"/>
-            </a:schemeClr>
-          </a:lnRef>
-          <a:fillRef idx="1">
-            <a:schemeClr val="accent2"/>
-          </a:fillRef>
-          <a:effectRef idx="0">
-            <a:schemeClr val="accent2"/>
-          </a:effectRef>
-          <a:fontRef idx="minor">
-            <a:schemeClr val="lt1"/>
-          </a:fontRef>
-        </p:style>
-        <p:txBody>
-          <a:bodyPr rtlCol="0" anchor="ctr"/>
-          <a:lstStyle/>
-          <a:p>
-            <a:pPr algn="ctr"/>
-            <a:endParaRPr lang="zh-CN" altLang="en-US"/>
-          </a:p>
-        </p:txBody>
-      </p:sp>
-      <p:sp>
-        <p:nvSpPr>
-          <p:cNvPr id="9" name="箭头: 右 8">
-            <a:extLst>
-              <a:ext uri="{FF2B5EF4-FFF2-40B4-BE49-F238E27FC236}">
-                <a16:creationId xmlns:a16="http://schemas.microsoft.com/office/drawing/2014/main" id="{2F585151-A179-46E0-9CC1-346AE0024840}"/>
-              </a:ext>
-            </a:extLst>
-          </p:cNvPr>
-          <p:cNvSpPr/>
-          <p:nvPr/>
-        </p:nvSpPr>
-        <p:spPr>
-          <a:xfrm rot="7984879">
-            <a:off x="4591745" y="3817328"/>
-            <a:ext cx="673433" cy="470517"/>
-          </a:xfrm>
-          <a:prstGeom prst="rightArrow">
-            <a:avLst/>
-          </a:prstGeom>
-        </p:spPr>
-        <p:style>
-          <a:lnRef idx="2">
-            <a:schemeClr val="accent2">
-              <a:shade val="50000"/>
-            </a:schemeClr>
-          </a:lnRef>
-          <a:fillRef idx="1">
-            <a:schemeClr val="accent2"/>
-          </a:fillRef>
-          <a:effectRef idx="0">
-            <a:schemeClr val="accent2"/>
-          </a:effectRef>
-          <a:fontRef idx="minor">
-            <a:schemeClr val="lt1"/>
-          </a:fontRef>
-        </p:style>
-        <p:txBody>
-          <a:bodyPr rtlCol="0" anchor="ctr"/>
-          <a:lstStyle/>
-          <a:p>
-            <a:pPr algn="ctr"/>
-            <a:endParaRPr lang="zh-CN" altLang="en-US"/>
-          </a:p>
-        </p:txBody>
-      </p:sp>
-      <p:sp>
-        <p:nvSpPr>
-          <p:cNvPr id="10" name="文本框 9">
-            <a:extLst>
-              <a:ext uri="{FF2B5EF4-FFF2-40B4-BE49-F238E27FC236}">
-                <a16:creationId xmlns:a16="http://schemas.microsoft.com/office/drawing/2014/main" id="{F34AEDBD-6E79-4E09-A697-32C6CCA48809}"/>
-              </a:ext>
-            </a:extLst>
-          </p:cNvPr>
-          <p:cNvSpPr txBox="1"/>
-          <p:nvPr/>
-        </p:nvSpPr>
-        <p:spPr>
-          <a:xfrm>
-            <a:off x="3127606" y="3741662"/>
-            <a:ext cx="1337226" cy="369332"/>
-          </a:xfrm>
-          <a:prstGeom prst="rect">
-            <a:avLst/>
-          </a:prstGeom>
-          <a:noFill/>
-        </p:spPr>
-        <p:txBody>
-          <a:bodyPr wrap="none" rtlCol="0">
-            <a:spAutoFit/>
-          </a:bodyPr>
-          <a:lstStyle/>
-          <a:p>
+              <a:t>measurer</a:t>
+            </a:r>
+            <a:r>
+              <a:rPr lang="zh-CN" altLang="en-US" dirty="0"/>
+              <a:t>提出请求</a:t>
+            </a:r>
             <a:r>
               <a:rPr lang="en-US" altLang="zh-CN" dirty="0"/>
-              <a:t>Failure alert</a:t>
-            </a:r>
-            <a:endParaRPr lang="zh-CN" altLang="en-US" dirty="0"/>
-          </a:p>
-        </p:txBody>
-      </p:sp>
-      <p:sp>
-        <p:nvSpPr>
-          <p:cNvPr id="22" name="箭头: 右 21">
-            <a:extLst>
-              <a:ext uri="{FF2B5EF4-FFF2-40B4-BE49-F238E27FC236}">
-                <a16:creationId xmlns:a16="http://schemas.microsoft.com/office/drawing/2014/main" id="{1D2DE9E9-CF05-4E33-B5DE-8B46427E9E87}"/>
-              </a:ext>
-            </a:extLst>
-          </p:cNvPr>
-          <p:cNvSpPr/>
-          <p:nvPr/>
-        </p:nvSpPr>
-        <p:spPr>
-          <a:xfrm rot="5400000">
-            <a:off x="3425439" y="5158392"/>
-            <a:ext cx="1379983" cy="470517"/>
-          </a:xfrm>
-          <a:prstGeom prst="rightArrow">
-            <a:avLst/>
-          </a:prstGeom>
-        </p:spPr>
-        <p:style>
-          <a:lnRef idx="2">
-            <a:schemeClr val="accent2">
-              <a:shade val="50000"/>
-            </a:schemeClr>
-          </a:lnRef>
-          <a:fillRef idx="1">
-            <a:schemeClr val="accent2"/>
-          </a:fillRef>
-          <a:effectRef idx="0">
-            <a:schemeClr val="accent2"/>
-          </a:effectRef>
-          <a:fontRef idx="minor">
-            <a:schemeClr val="lt1"/>
-          </a:fontRef>
-        </p:style>
-        <p:txBody>
-          <a:bodyPr rtlCol="0" anchor="ctr"/>
-          <a:lstStyle/>
-          <a:p>
-            <a:pPr algn="ctr"/>
-            <a:endParaRPr lang="zh-CN" altLang="en-US"/>
-          </a:p>
-        </p:txBody>
-      </p:sp>
-      <p:sp>
-        <p:nvSpPr>
-          <p:cNvPr id="16" name="文本框 15">
-            <a:extLst>
-              <a:ext uri="{FF2B5EF4-FFF2-40B4-BE49-F238E27FC236}">
-                <a16:creationId xmlns:a16="http://schemas.microsoft.com/office/drawing/2014/main" id="{E9FB10BF-5254-4E84-A096-F13DDCFA3D83}"/>
-              </a:ext>
-            </a:extLst>
-          </p:cNvPr>
-          <p:cNvSpPr txBox="1"/>
-          <p:nvPr/>
-        </p:nvSpPr>
-        <p:spPr>
-          <a:xfrm>
-            <a:off x="6802841" y="3828291"/>
-            <a:ext cx="1186543" cy="369332"/>
-          </a:xfrm>
-          <a:prstGeom prst="rect">
-            <a:avLst/>
-          </a:prstGeom>
-          <a:noFill/>
-        </p:spPr>
-        <p:txBody>
-          <a:bodyPr wrap="none" rtlCol="0">
-            <a:spAutoFit/>
-          </a:bodyPr>
-          <a:lstStyle/>
-          <a:p>
+              <a:t>REQUEST_TYPE_GET_DCN_INFO</a:t>
+            </a:r>
+            <a:r>
+              <a:rPr lang="zh-CN" altLang="en-US" dirty="0"/>
+              <a:t>获取（必做）</a:t>
+            </a:r>
+            <a:endParaRPr lang="en-US" altLang="zh-CN" dirty="0"/>
+          </a:p>
+          <a:p>
+            <a:pPr lvl="2"/>
+            <a:r>
+              <a:rPr lang="zh-CN" altLang="en-US" dirty="0"/>
+              <a:t>考虑到数据持久化，拓扑信息和设备流量异常信息可能会存入数据库（选作）</a:t>
+            </a:r>
+            <a:endParaRPr lang="en-US" altLang="zh-CN" dirty="0"/>
+          </a:p>
+          <a:p>
+            <a:r>
+              <a:rPr lang="zh-CN" altLang="en-US" dirty="0"/>
+              <a:t>根据拓扑变化（被动），设备</a:t>
+            </a:r>
             <a:r>
               <a:rPr lang="en-US" altLang="zh-CN" dirty="0"/>
-              <a:t>Burst alert</a:t>
-            </a:r>
-            <a:endParaRPr lang="zh-CN" altLang="en-US" dirty="0"/>
-          </a:p>
-        </p:txBody>
-      </p:sp>
-      <p:sp>
-        <p:nvSpPr>
-          <p:cNvPr id="18" name="箭头: 右 17">
-            <a:extLst>
-              <a:ext uri="{FF2B5EF4-FFF2-40B4-BE49-F238E27FC236}">
-                <a16:creationId xmlns:a16="http://schemas.microsoft.com/office/drawing/2014/main" id="{68D9F58D-2BD7-4D16-A8DE-B5BE44BC429C}"/>
-              </a:ext>
-            </a:extLst>
-          </p:cNvPr>
-          <p:cNvSpPr/>
-          <p:nvPr/>
-        </p:nvSpPr>
-        <p:spPr>
-          <a:xfrm rot="2477406">
-            <a:off x="6267255" y="3746760"/>
-            <a:ext cx="673433" cy="470517"/>
-          </a:xfrm>
-          <a:prstGeom prst="rightArrow">
-            <a:avLst/>
-          </a:prstGeom>
-        </p:spPr>
-        <p:style>
-          <a:lnRef idx="2">
-            <a:schemeClr val="accent2">
-              <a:shade val="50000"/>
-            </a:schemeClr>
-          </a:lnRef>
-          <a:fillRef idx="1">
-            <a:schemeClr val="accent2"/>
-          </a:fillRef>
-          <a:effectRef idx="0">
-            <a:schemeClr val="accent2"/>
-          </a:effectRef>
-          <a:fontRef idx="minor">
-            <a:schemeClr val="lt1"/>
-          </a:fontRef>
-        </p:style>
-        <p:txBody>
-          <a:bodyPr rtlCol="0" anchor="ctr"/>
-          <a:lstStyle/>
-          <a:p>
-            <a:pPr algn="ctr"/>
-            <a:endParaRPr lang="zh-CN" altLang="en-US"/>
-          </a:p>
-        </p:txBody>
-      </p:sp>
-      <p:sp>
-        <p:nvSpPr>
-          <p:cNvPr id="19" name="矩形 18">
-            <a:extLst>
-              <a:ext uri="{FF2B5EF4-FFF2-40B4-BE49-F238E27FC236}">
-                <a16:creationId xmlns:a16="http://schemas.microsoft.com/office/drawing/2014/main" id="{057EE364-F4D2-4689-A094-7097CDB8E85D}"/>
-              </a:ext>
-            </a:extLst>
-          </p:cNvPr>
-          <p:cNvSpPr/>
-          <p:nvPr/>
-        </p:nvSpPr>
-        <p:spPr>
-          <a:xfrm>
-            <a:off x="6124625" y="4238628"/>
-            <a:ext cx="2704971" cy="535762"/>
-          </a:xfrm>
-          <a:prstGeom prst="rect">
-            <a:avLst/>
-          </a:prstGeom>
-        </p:spPr>
-        <p:style>
-          <a:lnRef idx="2">
-            <a:schemeClr val="accent1">
-              <a:shade val="50000"/>
-            </a:schemeClr>
-          </a:lnRef>
-          <a:fillRef idx="1">
-            <a:schemeClr val="accent1"/>
-          </a:fillRef>
-          <a:effectRef idx="0">
-            <a:schemeClr val="accent1"/>
-          </a:effectRef>
-          <a:fontRef idx="minor">
-            <a:schemeClr val="lt1"/>
-          </a:fontRef>
-        </p:style>
-        <p:txBody>
-          <a:bodyPr rtlCol="0" anchor="ctr"/>
-          <a:lstStyle/>
-          <a:p>
-            <a:pPr algn="ctr"/>
+              <a:t>/</a:t>
+            </a:r>
+            <a:r>
+              <a:rPr lang="zh-CN" altLang="en-US" dirty="0"/>
+              <a:t>流量异常（主动）做决策：</a:t>
+            </a:r>
+            <a:endParaRPr lang="en-US" altLang="zh-CN" dirty="0"/>
+          </a:p>
+          <a:p>
+            <a:pPr lvl="1"/>
+            <a:r>
+              <a:rPr lang="zh-CN" altLang="en-US" dirty="0"/>
+              <a:t>决策服务功能链的故障恢复（必做）</a:t>
+            </a:r>
+            <a:endParaRPr lang="en-US" altLang="zh-CN" dirty="0"/>
+          </a:p>
+          <a:p>
+            <a:pPr lvl="2"/>
+            <a:r>
+              <a:rPr lang="zh-CN" altLang="en-US" dirty="0"/>
+              <a:t>例如服务器</a:t>
+            </a:r>
             <a:r>
               <a:rPr lang="en-US" altLang="zh-CN" dirty="0"/>
-              <a:t>Burst Alert processor </a:t>
-            </a:r>
-            <a:endParaRPr lang="zh-CN" altLang="en-US" dirty="0"/>
-          </a:p>
-        </p:txBody>
-      </p:sp>
-      <p:sp>
-        <p:nvSpPr>
-          <p:cNvPr id="20" name="箭头: 右 19">
-            <a:extLst>
-              <a:ext uri="{FF2B5EF4-FFF2-40B4-BE49-F238E27FC236}">
-                <a16:creationId xmlns:a16="http://schemas.microsoft.com/office/drawing/2014/main" id="{5A302AB3-5BA3-4159-8A66-6AD187FB9AAE}"/>
-              </a:ext>
-            </a:extLst>
-          </p:cNvPr>
-          <p:cNvSpPr/>
-          <p:nvPr/>
-        </p:nvSpPr>
-        <p:spPr>
-          <a:xfrm rot="5400000">
-            <a:off x="6787118" y="5110661"/>
-            <a:ext cx="1379983" cy="470517"/>
-          </a:xfrm>
-          <a:prstGeom prst="rightArrow">
-            <a:avLst/>
-          </a:prstGeom>
-        </p:spPr>
-        <p:style>
-          <a:lnRef idx="2">
-            <a:schemeClr val="accent2">
-              <a:shade val="50000"/>
-            </a:schemeClr>
-          </a:lnRef>
-          <a:fillRef idx="1">
-            <a:schemeClr val="accent2"/>
-          </a:fillRef>
-          <a:effectRef idx="0">
-            <a:schemeClr val="accent2"/>
-          </a:effectRef>
-          <a:fontRef idx="minor">
-            <a:schemeClr val="lt1"/>
-          </a:fontRef>
-        </p:style>
-        <p:txBody>
-          <a:bodyPr rtlCol="0" anchor="ctr"/>
-          <a:lstStyle/>
-          <a:p>
-            <a:pPr algn="ctr"/>
-            <a:endParaRPr lang="zh-CN" altLang="en-US"/>
-          </a:p>
-        </p:txBody>
-      </p:sp>
-      <p:sp>
-        <p:nvSpPr>
-          <p:cNvPr id="21" name="矩形 20">
-            <a:extLst>
-              <a:ext uri="{FF2B5EF4-FFF2-40B4-BE49-F238E27FC236}">
-                <a16:creationId xmlns:a16="http://schemas.microsoft.com/office/drawing/2014/main" id="{ADD31A74-4B59-496E-B5BC-1F104972C878}"/>
-              </a:ext>
-            </a:extLst>
-          </p:cNvPr>
-          <p:cNvSpPr/>
-          <p:nvPr/>
-        </p:nvSpPr>
-        <p:spPr>
-          <a:xfrm>
-            <a:off x="2011423" y="2832904"/>
-            <a:ext cx="2104007" cy="642068"/>
-          </a:xfrm>
-          <a:prstGeom prst="rect">
-            <a:avLst/>
-          </a:prstGeom>
-        </p:spPr>
-        <p:style>
-          <a:lnRef idx="2">
-            <a:schemeClr val="accent1">
-              <a:shade val="50000"/>
-            </a:schemeClr>
-          </a:lnRef>
-          <a:fillRef idx="1">
-            <a:schemeClr val="accent1"/>
-          </a:fillRef>
-          <a:effectRef idx="0">
-            <a:schemeClr val="accent1"/>
-          </a:effectRef>
-          <a:fontRef idx="minor">
-            <a:schemeClr val="lt1"/>
-          </a:fontRef>
-        </p:style>
-        <p:txBody>
-          <a:bodyPr rtlCol="0" anchor="ctr"/>
-          <a:lstStyle/>
-          <a:p>
-            <a:pPr algn="ctr"/>
-            <a:r>
-              <a:rPr lang="en-US" altLang="zh-CN" dirty="0" err="1"/>
-              <a:t>DatabaseAgent</a:t>
+              <a:t>/</a:t>
+            </a:r>
+            <a:r>
+              <a:rPr lang="zh-CN" altLang="en-US" dirty="0"/>
+              <a:t>交换机故障</a:t>
+            </a:r>
+            <a:r>
+              <a:rPr lang="en-US" altLang="zh-CN" dirty="0"/>
+              <a:t>/</a:t>
+            </a:r>
+            <a:r>
+              <a:rPr lang="zh-CN" altLang="en-US" dirty="0"/>
+              <a:t>异常导致服务功能链中断</a:t>
+            </a:r>
+            <a:r>
+              <a:rPr lang="en-US" altLang="zh-CN" dirty="0"/>
+              <a:t>/</a:t>
+            </a:r>
+            <a:r>
+              <a:rPr lang="zh-CN" altLang="en-US" dirty="0"/>
+              <a:t>服务质量下降，需要重新编排一个服务功能链</a:t>
             </a:r>
             <a:endParaRPr lang="en-US" altLang="zh-CN" dirty="0"/>
           </a:p>
-        </p:txBody>
-      </p:sp>
-      <p:sp>
-        <p:nvSpPr>
-          <p:cNvPr id="26" name="圆柱体 25">
-            <a:extLst>
-              <a:ext uri="{FF2B5EF4-FFF2-40B4-BE49-F238E27FC236}">
-                <a16:creationId xmlns:a16="http://schemas.microsoft.com/office/drawing/2014/main" id="{5B1BB3CA-891F-4BD3-8116-E095E74CD34D}"/>
-              </a:ext>
-            </a:extLst>
-          </p:cNvPr>
-          <p:cNvSpPr/>
-          <p:nvPr/>
-        </p:nvSpPr>
-        <p:spPr>
-          <a:xfrm>
-            <a:off x="2065449" y="1628291"/>
-            <a:ext cx="1805812" cy="719423"/>
-          </a:xfrm>
-          <a:prstGeom prst="can">
-            <a:avLst/>
-          </a:prstGeom>
-        </p:spPr>
-        <p:style>
-          <a:lnRef idx="2">
-            <a:schemeClr val="accent1">
-              <a:shade val="50000"/>
-            </a:schemeClr>
-          </a:lnRef>
-          <a:fillRef idx="1">
-            <a:schemeClr val="accent1"/>
-          </a:fillRef>
-          <a:effectRef idx="0">
-            <a:schemeClr val="accent1"/>
-          </a:effectRef>
-          <a:fontRef idx="minor">
-            <a:schemeClr val="lt1"/>
-          </a:fontRef>
-        </p:style>
-        <p:txBody>
-          <a:bodyPr rtlCol="0" anchor="ctr"/>
-          <a:lstStyle/>
-          <a:p>
-            <a:pPr algn="ctr"/>
+          <a:p>
+            <a:pPr lvl="1"/>
+            <a:r>
+              <a:rPr lang="zh-CN" altLang="en-US" dirty="0"/>
+              <a:t>决策启动哪些服务功能链的备份路径（选做）</a:t>
+            </a:r>
+            <a:endParaRPr lang="en-US" altLang="zh-CN" dirty="0"/>
+          </a:p>
+          <a:p>
+            <a:pPr lvl="1"/>
+            <a:r>
+              <a:rPr lang="zh-CN" altLang="en-US" dirty="0"/>
+              <a:t>决策是否增加</a:t>
+            </a:r>
             <a:r>
               <a:rPr lang="en-US" altLang="zh-CN" dirty="0"/>
-              <a:t>Request State</a:t>
-            </a:r>
-            <a:endParaRPr lang="zh-CN" altLang="en-US" dirty="0"/>
-          </a:p>
-        </p:txBody>
-      </p:sp>
-      <p:sp>
-        <p:nvSpPr>
-          <p:cNvPr id="27" name="箭头: 右 26">
-            <a:extLst>
-              <a:ext uri="{FF2B5EF4-FFF2-40B4-BE49-F238E27FC236}">
-                <a16:creationId xmlns:a16="http://schemas.microsoft.com/office/drawing/2014/main" id="{3982A353-504C-4DC3-8655-5707AA2F35FF}"/>
-              </a:ext>
-            </a:extLst>
-          </p:cNvPr>
-          <p:cNvSpPr/>
-          <p:nvPr/>
-        </p:nvSpPr>
-        <p:spPr>
-          <a:xfrm rot="5400000">
-            <a:off x="2653324" y="2275859"/>
-            <a:ext cx="630063" cy="470517"/>
-          </a:xfrm>
-          <a:prstGeom prst="rightArrow">
-            <a:avLst/>
-          </a:prstGeom>
-        </p:spPr>
-        <p:style>
-          <a:lnRef idx="2">
-            <a:schemeClr val="accent2">
-              <a:shade val="50000"/>
-            </a:schemeClr>
-          </a:lnRef>
-          <a:fillRef idx="1">
-            <a:schemeClr val="accent2"/>
-          </a:fillRef>
-          <a:effectRef idx="0">
-            <a:schemeClr val="accent2"/>
-          </a:effectRef>
-          <a:fontRef idx="minor">
-            <a:schemeClr val="lt1"/>
-          </a:fontRef>
-        </p:style>
-        <p:txBody>
-          <a:bodyPr rtlCol="0" anchor="ctr"/>
-          <a:lstStyle/>
-          <a:p>
-            <a:pPr algn="ctr"/>
-            <a:endParaRPr lang="zh-CN" altLang="en-US"/>
+              <a:t>/</a:t>
+            </a:r>
+            <a:r>
+              <a:rPr lang="zh-CN" altLang="en-US" dirty="0"/>
+              <a:t>减少一个服务功能链的实例数量（必做）</a:t>
+            </a:r>
+            <a:endParaRPr lang="en-US" altLang="zh-CN" dirty="0"/>
+          </a:p>
+          <a:p>
+            <a:pPr lvl="2"/>
+            <a:r>
+              <a:rPr lang="zh-CN" altLang="en-US" dirty="0"/>
+              <a:t>例如流量突增</a:t>
+            </a:r>
+            <a:r>
+              <a:rPr lang="en-US" altLang="zh-CN" dirty="0"/>
+              <a:t>/</a:t>
+            </a:r>
+            <a:r>
+              <a:rPr lang="zh-CN" altLang="en-US" dirty="0"/>
+              <a:t>降低需要相应地增加</a:t>
+            </a:r>
+            <a:r>
+              <a:rPr lang="en-US" altLang="zh-CN" dirty="0"/>
+              <a:t>/</a:t>
+            </a:r>
+            <a:r>
+              <a:rPr lang="zh-CN" altLang="en-US" dirty="0"/>
+              <a:t>减少服务功能链实例的数量</a:t>
+            </a:r>
+            <a:endParaRPr lang="en-US" altLang="zh-CN" dirty="0"/>
           </a:p>
         </p:txBody>
       </p:sp>
     </p:spTree>
     <p:extLst>
       <p:ext uri="{BB962C8B-B14F-4D97-AF65-F5344CB8AC3E}">
-        <p14:creationId xmlns:p14="http://schemas.microsoft.com/office/powerpoint/2010/main" val="3880209501"/>
+        <p14:creationId xmlns:p14="http://schemas.microsoft.com/office/powerpoint/2010/main" val="2985711991"/>
       </p:ext>
     </p:extLst>
   </p:cSld>
@@ -4161,6 +3666,1294 @@
           <p:cNvPr id="2" name="标题 1">
             <a:extLst>
               <a:ext uri="{FF2B5EF4-FFF2-40B4-BE49-F238E27FC236}">
+                <a16:creationId xmlns:a16="http://schemas.microsoft.com/office/drawing/2014/main" id="{40241C96-07BB-49E8-BDD7-A3D97261BEA8}"/>
+              </a:ext>
+            </a:extLst>
+          </p:cNvPr>
+          <p:cNvSpPr>
+            <a:spLocks noGrp="1"/>
+          </p:cNvSpPr>
+          <p:nvPr>
+            <p:ph type="title"/>
+          </p:nvPr>
+        </p:nvSpPr>
+        <p:spPr/>
+        <p:txBody>
+          <a:bodyPr/>
+          <a:lstStyle/>
+          <a:p>
+            <a:r>
+              <a:rPr lang="en-US" altLang="zh-CN" dirty="0"/>
+              <a:t>Requirements</a:t>
+            </a:r>
+            <a:endParaRPr lang="zh-CN" altLang="en-US" dirty="0"/>
+          </a:p>
+        </p:txBody>
+      </p:sp>
+      <p:sp>
+        <p:nvSpPr>
+          <p:cNvPr id="3" name="内容占位符 2">
+            <a:extLst>
+              <a:ext uri="{FF2B5EF4-FFF2-40B4-BE49-F238E27FC236}">
+                <a16:creationId xmlns:a16="http://schemas.microsoft.com/office/drawing/2014/main" id="{2A792C21-D52A-4E05-A6DD-ADDD79B1D205}"/>
+              </a:ext>
+            </a:extLst>
+          </p:cNvPr>
+          <p:cNvSpPr>
+            <a:spLocks noGrp="1"/>
+          </p:cNvSpPr>
+          <p:nvPr>
+            <p:ph idx="1"/>
+          </p:nvPr>
+        </p:nvSpPr>
+        <p:spPr/>
+        <p:txBody>
+          <a:bodyPr/>
+          <a:lstStyle/>
+          <a:p>
+            <a:r>
+              <a:rPr lang="zh-CN" altLang="en-US" dirty="0"/>
+              <a:t>决策种类：</a:t>
+            </a:r>
+            <a:endParaRPr lang="en-US" altLang="zh-CN" dirty="0"/>
+          </a:p>
+          <a:p>
+            <a:pPr lvl="1"/>
+            <a:r>
+              <a:rPr lang="en-US" altLang="zh-CN" sz="2000" b="1" dirty="0">
+                <a:effectLst/>
+                <a:latin typeface="Consolas" panose="020B0609020204030204" pitchFamily="49" charset="0"/>
+              </a:rPr>
+              <a:t>CMD_TYPE_ADD_SFCI</a:t>
+            </a:r>
+          </a:p>
+          <a:p>
+            <a:pPr lvl="2"/>
+            <a:r>
+              <a:rPr lang="zh-CN" altLang="en-US" sz="1600" b="1" dirty="0">
+                <a:latin typeface="Consolas" panose="020B0609020204030204" pitchFamily="49" charset="0"/>
+              </a:rPr>
+              <a:t>流量突增时，增加一条服务链实例</a:t>
+            </a:r>
+            <a:endParaRPr lang="en-US" altLang="zh-CN" sz="1600" b="1" dirty="0">
+              <a:latin typeface="Consolas" panose="020B0609020204030204" pitchFamily="49" charset="0"/>
+            </a:endParaRPr>
+          </a:p>
+          <a:p>
+            <a:pPr lvl="2"/>
+            <a:r>
+              <a:rPr lang="zh-CN" altLang="en-US" sz="1600" b="1" dirty="0">
+                <a:effectLst/>
+                <a:latin typeface="Consolas" panose="020B0609020204030204" pitchFamily="49" charset="0"/>
+              </a:rPr>
+              <a:t>故障恢复时，重新部署一条新的服务链实例</a:t>
+            </a:r>
+            <a:endParaRPr lang="en-US" altLang="zh-CN" sz="1600" b="1" dirty="0">
+              <a:effectLst/>
+              <a:latin typeface="Consolas" panose="020B0609020204030204" pitchFamily="49" charset="0"/>
+            </a:endParaRPr>
+          </a:p>
+          <a:p>
+            <a:pPr lvl="1"/>
+            <a:r>
+              <a:rPr lang="en-US" altLang="zh-CN" sz="2000" b="1" dirty="0">
+                <a:effectLst/>
+                <a:latin typeface="Consolas" panose="020B0609020204030204" pitchFamily="49" charset="0"/>
+              </a:rPr>
+              <a:t>CMD_TYPE_DEL_SFCI</a:t>
+            </a:r>
+          </a:p>
+          <a:p>
+            <a:pPr lvl="2"/>
+            <a:r>
+              <a:rPr lang="zh-CN" altLang="en-US" sz="1600" b="1" dirty="0">
+                <a:latin typeface="Consolas" panose="020B0609020204030204" pitchFamily="49" charset="0"/>
+              </a:rPr>
+              <a:t>流量大小下降，减少一条服务链实例</a:t>
+            </a:r>
+            <a:endParaRPr lang="en-US" altLang="zh-CN" sz="1600" b="1" dirty="0">
+              <a:latin typeface="Consolas" panose="020B0609020204030204" pitchFamily="49" charset="0"/>
+            </a:endParaRPr>
+          </a:p>
+          <a:p>
+            <a:pPr lvl="2"/>
+            <a:r>
+              <a:rPr lang="zh-CN" altLang="en-US" sz="1600" b="1" dirty="0">
+                <a:effectLst/>
+                <a:latin typeface="Consolas" panose="020B0609020204030204" pitchFamily="49" charset="0"/>
+              </a:rPr>
+              <a:t>故障恢复时，删除一条故障的服务链实例</a:t>
+            </a:r>
+          </a:p>
+          <a:p>
+            <a:endParaRPr lang="zh-CN" altLang="en-US" dirty="0"/>
+          </a:p>
+        </p:txBody>
+      </p:sp>
+    </p:spTree>
+    <p:extLst>
+      <p:ext uri="{BB962C8B-B14F-4D97-AF65-F5344CB8AC3E}">
+        <p14:creationId xmlns:p14="http://schemas.microsoft.com/office/powerpoint/2010/main" val="3054340279"/>
+      </p:ext>
+    </p:extLst>
+  </p:cSld>
+  <p:clrMapOvr>
+    <a:masterClrMapping/>
+  </p:clrMapOvr>
+</p:sld>
+</file>
+
+<file path=ppt/slides/slide4.xml><?xml version="1.0" encoding="utf-8"?>
+<p:sld xmlns:a="http://schemas.openxmlformats.org/drawingml/2006/main" xmlns:r="http://schemas.openxmlformats.org/officeDocument/2006/relationships" xmlns:p="http://schemas.openxmlformats.org/presentationml/2006/main">
+  <p:cSld>
+    <p:spTree>
+      <p:nvGrpSpPr>
+        <p:cNvPr id="1" name=""/>
+        <p:cNvGrpSpPr/>
+        <p:nvPr/>
+      </p:nvGrpSpPr>
+      <p:grpSpPr>
+        <a:xfrm>
+          <a:off x="0" y="0"/>
+          <a:ext cx="0" cy="0"/>
+          <a:chOff x="0" y="0"/>
+          <a:chExt cx="0" cy="0"/>
+        </a:xfrm>
+      </p:grpSpPr>
+      <p:sp>
+        <p:nvSpPr>
+          <p:cNvPr id="4" name="矩形 3">
+            <a:extLst>
+              <a:ext uri="{FF2B5EF4-FFF2-40B4-BE49-F238E27FC236}">
+                <a16:creationId xmlns:a16="http://schemas.microsoft.com/office/drawing/2014/main" id="{4936DC08-1554-470C-A2BD-377C9EF887DD}"/>
+              </a:ext>
+            </a:extLst>
+          </p:cNvPr>
+          <p:cNvSpPr/>
+          <p:nvPr/>
+        </p:nvSpPr>
+        <p:spPr>
+          <a:xfrm>
+            <a:off x="844941" y="2138537"/>
+            <a:ext cx="10644326" cy="4007740"/>
+          </a:xfrm>
+          <a:prstGeom prst="rect">
+            <a:avLst/>
+          </a:prstGeom>
+          <a:noFill/>
+        </p:spPr>
+        <p:style>
+          <a:lnRef idx="2">
+            <a:schemeClr val="accent6"/>
+          </a:lnRef>
+          <a:fillRef idx="1">
+            <a:schemeClr val="lt1"/>
+          </a:fillRef>
+          <a:effectRef idx="0">
+            <a:schemeClr val="accent6"/>
+          </a:effectRef>
+          <a:fontRef idx="minor">
+            <a:schemeClr val="dk1"/>
+          </a:fontRef>
+        </p:style>
+        <p:txBody>
+          <a:bodyPr rtlCol="0" anchor="ctr"/>
+          <a:lstStyle/>
+          <a:p>
+            <a:pPr algn="ctr"/>
+            <a:endParaRPr lang="zh-CN" altLang="en-US" dirty="0"/>
+          </a:p>
+        </p:txBody>
+      </p:sp>
+      <p:sp>
+        <p:nvSpPr>
+          <p:cNvPr id="2" name="标题 1">
+            <a:extLst>
+              <a:ext uri="{FF2B5EF4-FFF2-40B4-BE49-F238E27FC236}">
+                <a16:creationId xmlns:a16="http://schemas.microsoft.com/office/drawing/2014/main" id="{75FA18FA-C233-48A7-AF85-B2D1F5F89946}"/>
+              </a:ext>
+            </a:extLst>
+          </p:cNvPr>
+          <p:cNvSpPr>
+            <a:spLocks noGrp="1"/>
+          </p:cNvSpPr>
+          <p:nvPr>
+            <p:ph type="title"/>
+          </p:nvPr>
+        </p:nvSpPr>
+        <p:spPr/>
+        <p:txBody>
+          <a:bodyPr/>
+          <a:lstStyle/>
+          <a:p>
+            <a:r>
+              <a:rPr lang="en-US" altLang="zh-CN" dirty="0"/>
+              <a:t>SAM Design – Adaptive</a:t>
+            </a:r>
+            <a:endParaRPr lang="zh-CN" altLang="en-US" dirty="0"/>
+          </a:p>
+        </p:txBody>
+      </p:sp>
+      <p:sp>
+        <p:nvSpPr>
+          <p:cNvPr id="5" name="矩形 4">
+            <a:extLst>
+              <a:ext uri="{FF2B5EF4-FFF2-40B4-BE49-F238E27FC236}">
+                <a16:creationId xmlns:a16="http://schemas.microsoft.com/office/drawing/2014/main" id="{D3D897B1-4F28-4913-9605-0F11B3D0EAD4}"/>
+              </a:ext>
+            </a:extLst>
+          </p:cNvPr>
+          <p:cNvSpPr/>
+          <p:nvPr/>
+        </p:nvSpPr>
+        <p:spPr>
+          <a:xfrm>
+            <a:off x="4406931" y="3866159"/>
+            <a:ext cx="2704971" cy="535762"/>
+          </a:xfrm>
+          <a:prstGeom prst="rect">
+            <a:avLst/>
+          </a:prstGeom>
+        </p:spPr>
+        <p:style>
+          <a:lnRef idx="2">
+            <a:schemeClr val="accent1">
+              <a:shade val="50000"/>
+            </a:schemeClr>
+          </a:lnRef>
+          <a:fillRef idx="1">
+            <a:schemeClr val="accent1"/>
+          </a:fillRef>
+          <a:effectRef idx="0">
+            <a:schemeClr val="accent1"/>
+          </a:effectRef>
+          <a:fontRef idx="minor">
+            <a:schemeClr val="lt1"/>
+          </a:fontRef>
+        </p:style>
+        <p:txBody>
+          <a:bodyPr rtlCol="0" anchor="ctr"/>
+          <a:lstStyle/>
+          <a:p>
+            <a:pPr algn="ctr"/>
+            <a:r>
+              <a:rPr lang="en-US" altLang="zh-CN" dirty="0"/>
+              <a:t>Failure/Anomaly Alert processor </a:t>
+            </a:r>
+            <a:endParaRPr lang="zh-CN" altLang="en-US" dirty="0"/>
+          </a:p>
+        </p:txBody>
+      </p:sp>
+      <p:sp>
+        <p:nvSpPr>
+          <p:cNvPr id="7" name="文本框 6">
+            <a:extLst>
+              <a:ext uri="{FF2B5EF4-FFF2-40B4-BE49-F238E27FC236}">
+                <a16:creationId xmlns:a16="http://schemas.microsoft.com/office/drawing/2014/main" id="{23FC44CC-61B5-48F9-A828-E5266467FEDD}"/>
+              </a:ext>
+            </a:extLst>
+          </p:cNvPr>
+          <p:cNvSpPr txBox="1"/>
+          <p:nvPr/>
+        </p:nvSpPr>
+        <p:spPr>
+          <a:xfrm>
+            <a:off x="7598578" y="1431220"/>
+            <a:ext cx="1298753" cy="369332"/>
+          </a:xfrm>
+          <a:prstGeom prst="rect">
+            <a:avLst/>
+          </a:prstGeom>
+          <a:noFill/>
+        </p:spPr>
+        <p:txBody>
+          <a:bodyPr wrap="none" rtlCol="0">
+            <a:spAutoFit/>
+          </a:bodyPr>
+          <a:lstStyle/>
+          <a:p>
+            <a:r>
+              <a:rPr lang="en-US" altLang="zh-CN" b="1" dirty="0"/>
+              <a:t>DCN_INFO</a:t>
+            </a:r>
+            <a:endParaRPr lang="zh-CN" altLang="en-US" b="1" dirty="0"/>
+          </a:p>
+        </p:txBody>
+      </p:sp>
+      <p:sp>
+        <p:nvSpPr>
+          <p:cNvPr id="8" name="矩形 7">
+            <a:extLst>
+              <a:ext uri="{FF2B5EF4-FFF2-40B4-BE49-F238E27FC236}">
+                <a16:creationId xmlns:a16="http://schemas.microsoft.com/office/drawing/2014/main" id="{A6C2DB94-9DFA-4E47-A700-016BCB4BA960}"/>
+              </a:ext>
+            </a:extLst>
+          </p:cNvPr>
+          <p:cNvSpPr/>
+          <p:nvPr/>
+        </p:nvSpPr>
+        <p:spPr>
+          <a:xfrm>
+            <a:off x="6434583" y="1952692"/>
+            <a:ext cx="2007831" cy="535762"/>
+          </a:xfrm>
+          <a:prstGeom prst="rect">
+            <a:avLst/>
+          </a:prstGeom>
+        </p:spPr>
+        <p:style>
+          <a:lnRef idx="2">
+            <a:schemeClr val="accent1">
+              <a:shade val="50000"/>
+            </a:schemeClr>
+          </a:lnRef>
+          <a:fillRef idx="1">
+            <a:schemeClr val="accent1"/>
+          </a:fillRef>
+          <a:effectRef idx="0">
+            <a:schemeClr val="accent1"/>
+          </a:effectRef>
+          <a:fontRef idx="minor">
+            <a:schemeClr val="lt1"/>
+          </a:fontRef>
+        </p:style>
+        <p:txBody>
+          <a:bodyPr rtlCol="0" anchor="ctr"/>
+          <a:lstStyle/>
+          <a:p>
+            <a:pPr algn="ctr"/>
+            <a:r>
+              <a:rPr lang="en-US" altLang="zh-CN" dirty="0" err="1"/>
+              <a:t>MessageAgent</a:t>
+            </a:r>
+            <a:endParaRPr lang="zh-CN" altLang="en-US" dirty="0"/>
+          </a:p>
+        </p:txBody>
+      </p:sp>
+      <p:sp>
+        <p:nvSpPr>
+          <p:cNvPr id="6" name="箭头: 右 5">
+            <a:extLst>
+              <a:ext uri="{FF2B5EF4-FFF2-40B4-BE49-F238E27FC236}">
+                <a16:creationId xmlns:a16="http://schemas.microsoft.com/office/drawing/2014/main" id="{AFABD06F-FE3C-44CB-A355-AF185771326E}"/>
+              </a:ext>
+            </a:extLst>
+          </p:cNvPr>
+          <p:cNvSpPr/>
+          <p:nvPr/>
+        </p:nvSpPr>
+        <p:spPr>
+          <a:xfrm rot="5400000">
+            <a:off x="7101779" y="1495283"/>
+            <a:ext cx="673434" cy="470517"/>
+          </a:xfrm>
+          <a:prstGeom prst="rightArrow">
+            <a:avLst/>
+          </a:prstGeom>
+        </p:spPr>
+        <p:style>
+          <a:lnRef idx="2">
+            <a:schemeClr val="accent2">
+              <a:shade val="50000"/>
+            </a:schemeClr>
+          </a:lnRef>
+          <a:fillRef idx="1">
+            <a:schemeClr val="accent2"/>
+          </a:fillRef>
+          <a:effectRef idx="0">
+            <a:schemeClr val="accent2"/>
+          </a:effectRef>
+          <a:fontRef idx="minor">
+            <a:schemeClr val="lt1"/>
+          </a:fontRef>
+        </p:style>
+        <p:txBody>
+          <a:bodyPr rtlCol="0" anchor="ctr"/>
+          <a:lstStyle/>
+          <a:p>
+            <a:pPr algn="ctr"/>
+            <a:endParaRPr lang="zh-CN" altLang="en-US"/>
+          </a:p>
+        </p:txBody>
+      </p:sp>
+      <p:sp>
+        <p:nvSpPr>
+          <p:cNvPr id="10" name="文本框 9">
+            <a:extLst>
+              <a:ext uri="{FF2B5EF4-FFF2-40B4-BE49-F238E27FC236}">
+                <a16:creationId xmlns:a16="http://schemas.microsoft.com/office/drawing/2014/main" id="{F34AEDBD-6E79-4E09-A697-32C6CCA48809}"/>
+              </a:ext>
+            </a:extLst>
+          </p:cNvPr>
+          <p:cNvSpPr txBox="1"/>
+          <p:nvPr/>
+        </p:nvSpPr>
+        <p:spPr>
+          <a:xfrm>
+            <a:off x="4387328" y="3557099"/>
+            <a:ext cx="1983235" cy="369332"/>
+          </a:xfrm>
+          <a:prstGeom prst="rect">
+            <a:avLst/>
+          </a:prstGeom>
+          <a:noFill/>
+        </p:spPr>
+        <p:txBody>
+          <a:bodyPr wrap="none" rtlCol="0">
+            <a:spAutoFit/>
+          </a:bodyPr>
+          <a:lstStyle/>
+          <a:p>
+            <a:r>
+              <a:rPr lang="en-US" altLang="zh-CN" b="1" dirty="0" err="1"/>
+              <a:t>topologyQueue</a:t>
+            </a:r>
+            <a:r>
+              <a:rPr lang="en-US" altLang="zh-CN" b="1" dirty="0"/>
+              <a:t>()</a:t>
+            </a:r>
+            <a:endParaRPr lang="zh-CN" altLang="en-US" b="1" dirty="0"/>
+          </a:p>
+        </p:txBody>
+      </p:sp>
+      <p:sp>
+        <p:nvSpPr>
+          <p:cNvPr id="16" name="文本框 15">
+            <a:extLst>
+              <a:ext uri="{FF2B5EF4-FFF2-40B4-BE49-F238E27FC236}">
+                <a16:creationId xmlns:a16="http://schemas.microsoft.com/office/drawing/2014/main" id="{E9FB10BF-5254-4E84-A096-F13DDCFA3D83}"/>
+              </a:ext>
+            </a:extLst>
+          </p:cNvPr>
+          <p:cNvSpPr txBox="1"/>
+          <p:nvPr/>
+        </p:nvSpPr>
+        <p:spPr>
+          <a:xfrm>
+            <a:off x="8517032" y="3557099"/>
+            <a:ext cx="1483098" cy="369332"/>
+          </a:xfrm>
+          <a:prstGeom prst="rect">
+            <a:avLst/>
+          </a:prstGeom>
+          <a:noFill/>
+        </p:spPr>
+        <p:txBody>
+          <a:bodyPr wrap="none" rtlCol="0">
+            <a:spAutoFit/>
+          </a:bodyPr>
+          <a:lstStyle/>
+          <a:p>
+            <a:r>
+              <a:rPr lang="en-US" altLang="zh-CN" b="1" dirty="0" err="1"/>
+              <a:t>flowQueue</a:t>
+            </a:r>
+            <a:r>
+              <a:rPr lang="en-US" altLang="zh-CN" b="1" dirty="0"/>
+              <a:t>()</a:t>
+            </a:r>
+            <a:endParaRPr lang="zh-CN" altLang="en-US" b="1" dirty="0"/>
+          </a:p>
+        </p:txBody>
+      </p:sp>
+      <p:sp>
+        <p:nvSpPr>
+          <p:cNvPr id="19" name="矩形 18">
+            <a:extLst>
+              <a:ext uri="{FF2B5EF4-FFF2-40B4-BE49-F238E27FC236}">
+                <a16:creationId xmlns:a16="http://schemas.microsoft.com/office/drawing/2014/main" id="{057EE364-F4D2-4689-A094-7097CDB8E85D}"/>
+              </a:ext>
+            </a:extLst>
+          </p:cNvPr>
+          <p:cNvSpPr/>
+          <p:nvPr/>
+        </p:nvSpPr>
+        <p:spPr>
+          <a:xfrm>
+            <a:off x="7795716" y="3866159"/>
+            <a:ext cx="2704971" cy="535762"/>
+          </a:xfrm>
+          <a:prstGeom prst="rect">
+            <a:avLst/>
+          </a:prstGeom>
+        </p:spPr>
+        <p:style>
+          <a:lnRef idx="2">
+            <a:schemeClr val="accent1">
+              <a:shade val="50000"/>
+            </a:schemeClr>
+          </a:lnRef>
+          <a:fillRef idx="1">
+            <a:schemeClr val="accent1"/>
+          </a:fillRef>
+          <a:effectRef idx="0">
+            <a:schemeClr val="accent1"/>
+          </a:effectRef>
+          <a:fontRef idx="minor">
+            <a:schemeClr val="lt1"/>
+          </a:fontRef>
+        </p:style>
+        <p:txBody>
+          <a:bodyPr rtlCol="0" anchor="ctr"/>
+          <a:lstStyle/>
+          <a:p>
+            <a:pPr algn="ctr"/>
+            <a:r>
+              <a:rPr lang="en-US" altLang="zh-CN" dirty="0"/>
+              <a:t>Traffic Size Alert processor </a:t>
+            </a:r>
+            <a:endParaRPr lang="zh-CN" altLang="en-US" dirty="0"/>
+          </a:p>
+        </p:txBody>
+      </p:sp>
+      <p:sp>
+        <p:nvSpPr>
+          <p:cNvPr id="21" name="矩形 20">
+            <a:extLst>
+              <a:ext uri="{FF2B5EF4-FFF2-40B4-BE49-F238E27FC236}">
+                <a16:creationId xmlns:a16="http://schemas.microsoft.com/office/drawing/2014/main" id="{ADD31A74-4B59-496E-B5BC-1F104972C878}"/>
+              </a:ext>
+            </a:extLst>
+          </p:cNvPr>
+          <p:cNvSpPr/>
+          <p:nvPr/>
+        </p:nvSpPr>
+        <p:spPr>
+          <a:xfrm>
+            <a:off x="1916351" y="2846824"/>
+            <a:ext cx="2104007" cy="642068"/>
+          </a:xfrm>
+          <a:prstGeom prst="rect">
+            <a:avLst/>
+          </a:prstGeom>
+        </p:spPr>
+        <p:style>
+          <a:lnRef idx="2">
+            <a:schemeClr val="accent1">
+              <a:shade val="50000"/>
+            </a:schemeClr>
+          </a:lnRef>
+          <a:fillRef idx="1">
+            <a:schemeClr val="accent1"/>
+          </a:fillRef>
+          <a:effectRef idx="0">
+            <a:schemeClr val="accent1"/>
+          </a:effectRef>
+          <a:fontRef idx="minor">
+            <a:schemeClr val="lt1"/>
+          </a:fontRef>
+        </p:style>
+        <p:txBody>
+          <a:bodyPr rtlCol="0" anchor="ctr"/>
+          <a:lstStyle/>
+          <a:p>
+            <a:pPr algn="ctr"/>
+            <a:r>
+              <a:rPr lang="en-US" altLang="zh-CN" dirty="0" err="1"/>
+              <a:t>DatabaseAgent</a:t>
+            </a:r>
+            <a:endParaRPr lang="en-US" altLang="zh-CN" dirty="0"/>
+          </a:p>
+        </p:txBody>
+      </p:sp>
+      <p:sp>
+        <p:nvSpPr>
+          <p:cNvPr id="26" name="圆柱体 25">
+            <a:extLst>
+              <a:ext uri="{FF2B5EF4-FFF2-40B4-BE49-F238E27FC236}">
+                <a16:creationId xmlns:a16="http://schemas.microsoft.com/office/drawing/2014/main" id="{5B1BB3CA-891F-4BD3-8116-E095E74CD34D}"/>
+              </a:ext>
+            </a:extLst>
+          </p:cNvPr>
+          <p:cNvSpPr/>
+          <p:nvPr/>
+        </p:nvSpPr>
+        <p:spPr>
+          <a:xfrm>
+            <a:off x="2065448" y="1359040"/>
+            <a:ext cx="1805812" cy="719423"/>
+          </a:xfrm>
+          <a:prstGeom prst="can">
+            <a:avLst/>
+          </a:prstGeom>
+        </p:spPr>
+        <p:style>
+          <a:lnRef idx="2">
+            <a:schemeClr val="accent1">
+              <a:shade val="50000"/>
+            </a:schemeClr>
+          </a:lnRef>
+          <a:fillRef idx="1">
+            <a:schemeClr val="accent1"/>
+          </a:fillRef>
+          <a:effectRef idx="0">
+            <a:schemeClr val="accent1"/>
+          </a:effectRef>
+          <a:fontRef idx="minor">
+            <a:schemeClr val="lt1"/>
+          </a:fontRef>
+        </p:style>
+        <p:txBody>
+          <a:bodyPr rtlCol="0" anchor="ctr"/>
+          <a:lstStyle/>
+          <a:p>
+            <a:pPr algn="ctr"/>
+            <a:r>
+              <a:rPr lang="en-US" altLang="zh-CN" dirty="0"/>
+              <a:t>Request State</a:t>
+            </a:r>
+            <a:endParaRPr lang="zh-CN" altLang="en-US" dirty="0"/>
+          </a:p>
+        </p:txBody>
+      </p:sp>
+      <p:sp>
+        <p:nvSpPr>
+          <p:cNvPr id="27" name="箭头: 右 26">
+            <a:extLst>
+              <a:ext uri="{FF2B5EF4-FFF2-40B4-BE49-F238E27FC236}">
+                <a16:creationId xmlns:a16="http://schemas.microsoft.com/office/drawing/2014/main" id="{3982A353-504C-4DC3-8655-5707AA2F35FF}"/>
+              </a:ext>
+            </a:extLst>
+          </p:cNvPr>
+          <p:cNvSpPr/>
+          <p:nvPr/>
+        </p:nvSpPr>
+        <p:spPr>
+          <a:xfrm rot="5400000">
+            <a:off x="2634259" y="2203834"/>
+            <a:ext cx="630063" cy="470517"/>
+          </a:xfrm>
+          <a:prstGeom prst="rightArrow">
+            <a:avLst/>
+          </a:prstGeom>
+        </p:spPr>
+        <p:style>
+          <a:lnRef idx="2">
+            <a:schemeClr val="accent2">
+              <a:shade val="50000"/>
+            </a:schemeClr>
+          </a:lnRef>
+          <a:fillRef idx="1">
+            <a:schemeClr val="accent2"/>
+          </a:fillRef>
+          <a:effectRef idx="0">
+            <a:schemeClr val="accent2"/>
+          </a:effectRef>
+          <a:fontRef idx="minor">
+            <a:schemeClr val="lt1"/>
+          </a:fontRef>
+        </p:style>
+        <p:txBody>
+          <a:bodyPr rtlCol="0" anchor="ctr"/>
+          <a:lstStyle/>
+          <a:p>
+            <a:pPr algn="ctr"/>
+            <a:endParaRPr lang="zh-CN" altLang="en-US"/>
+          </a:p>
+        </p:txBody>
+      </p:sp>
+      <p:sp>
+        <p:nvSpPr>
+          <p:cNvPr id="3" name="文本框 2">
+            <a:extLst>
+              <a:ext uri="{FF2B5EF4-FFF2-40B4-BE49-F238E27FC236}">
+                <a16:creationId xmlns:a16="http://schemas.microsoft.com/office/drawing/2014/main" id="{0E454A4B-372B-4536-8BBF-A16FA9793790}"/>
+              </a:ext>
+            </a:extLst>
+          </p:cNvPr>
+          <p:cNvSpPr txBox="1"/>
+          <p:nvPr/>
+        </p:nvSpPr>
+        <p:spPr>
+          <a:xfrm>
+            <a:off x="7717084" y="5616349"/>
+            <a:ext cx="2337499" cy="646331"/>
+          </a:xfrm>
+          <a:prstGeom prst="rect">
+            <a:avLst/>
+          </a:prstGeom>
+          <a:noFill/>
+        </p:spPr>
+        <p:txBody>
+          <a:bodyPr wrap="none" rtlCol="0">
+            <a:spAutoFit/>
+          </a:bodyPr>
+          <a:lstStyle/>
+          <a:p>
+            <a:r>
+              <a:rPr lang="en-US" altLang="zh-CN" sz="1800" b="1" dirty="0">
+                <a:effectLst/>
+                <a:latin typeface="Consolas" panose="020B0609020204030204" pitchFamily="49" charset="0"/>
+              </a:rPr>
+              <a:t>CMD_TYPE_ADD_SFCI</a:t>
+            </a:r>
+          </a:p>
+          <a:p>
+            <a:r>
+              <a:rPr lang="en-US" altLang="zh-CN" sz="1800" b="1" dirty="0">
+                <a:effectLst/>
+                <a:latin typeface="Consolas" panose="020B0609020204030204" pitchFamily="49" charset="0"/>
+              </a:rPr>
+              <a:t>CMD_TYPE_DEL_SFCI</a:t>
+            </a:r>
+          </a:p>
+        </p:txBody>
+      </p:sp>
+      <p:sp>
+        <p:nvSpPr>
+          <p:cNvPr id="24" name="矩形 23">
+            <a:extLst>
+              <a:ext uri="{FF2B5EF4-FFF2-40B4-BE49-F238E27FC236}">
+                <a16:creationId xmlns:a16="http://schemas.microsoft.com/office/drawing/2014/main" id="{2ED7F04D-7627-402B-AA5E-35D5A6EA67D9}"/>
+              </a:ext>
+            </a:extLst>
+          </p:cNvPr>
+          <p:cNvSpPr/>
+          <p:nvPr/>
+        </p:nvSpPr>
+        <p:spPr>
+          <a:xfrm>
+            <a:off x="5134742" y="4962063"/>
+            <a:ext cx="4348623" cy="535762"/>
+          </a:xfrm>
+          <a:prstGeom prst="rect">
+            <a:avLst/>
+          </a:prstGeom>
+        </p:spPr>
+        <p:style>
+          <a:lnRef idx="2">
+            <a:schemeClr val="accent1">
+              <a:shade val="50000"/>
+            </a:schemeClr>
+          </a:lnRef>
+          <a:fillRef idx="1">
+            <a:schemeClr val="accent1"/>
+          </a:fillRef>
+          <a:effectRef idx="0">
+            <a:schemeClr val="accent1"/>
+          </a:effectRef>
+          <a:fontRef idx="minor">
+            <a:schemeClr val="lt1"/>
+          </a:fontRef>
+        </p:style>
+        <p:txBody>
+          <a:bodyPr rtlCol="0" anchor="ctr"/>
+          <a:lstStyle/>
+          <a:p>
+            <a:pPr algn="ctr"/>
+            <a:r>
+              <a:rPr lang="en-US" altLang="zh-CN" dirty="0"/>
+              <a:t>Alert Processor</a:t>
+            </a:r>
+            <a:endParaRPr lang="zh-CN" altLang="en-US" dirty="0"/>
+          </a:p>
+        </p:txBody>
+      </p:sp>
+      <p:sp>
+        <p:nvSpPr>
+          <p:cNvPr id="22" name="箭头: 右 21">
+            <a:extLst>
+              <a:ext uri="{FF2B5EF4-FFF2-40B4-BE49-F238E27FC236}">
+                <a16:creationId xmlns:a16="http://schemas.microsoft.com/office/drawing/2014/main" id="{1D2DE9E9-CF05-4E33-B5DE-8B46427E9E87}"/>
+              </a:ext>
+            </a:extLst>
+          </p:cNvPr>
+          <p:cNvSpPr/>
+          <p:nvPr/>
+        </p:nvSpPr>
+        <p:spPr>
+          <a:xfrm rot="5400000">
+            <a:off x="5417480" y="4528847"/>
+            <a:ext cx="683870" cy="470517"/>
+          </a:xfrm>
+          <a:prstGeom prst="rightArrow">
+            <a:avLst/>
+          </a:prstGeom>
+        </p:spPr>
+        <p:style>
+          <a:lnRef idx="2">
+            <a:schemeClr val="accent2">
+              <a:shade val="50000"/>
+            </a:schemeClr>
+          </a:lnRef>
+          <a:fillRef idx="1">
+            <a:schemeClr val="accent2"/>
+          </a:fillRef>
+          <a:effectRef idx="0">
+            <a:schemeClr val="accent2"/>
+          </a:effectRef>
+          <a:fontRef idx="minor">
+            <a:schemeClr val="lt1"/>
+          </a:fontRef>
+        </p:style>
+        <p:txBody>
+          <a:bodyPr rtlCol="0" anchor="ctr"/>
+          <a:lstStyle/>
+          <a:p>
+            <a:pPr algn="ctr"/>
+            <a:endParaRPr lang="zh-CN" altLang="en-US"/>
+          </a:p>
+        </p:txBody>
+      </p:sp>
+      <p:sp>
+        <p:nvSpPr>
+          <p:cNvPr id="20" name="箭头: 右 19">
+            <a:extLst>
+              <a:ext uri="{FF2B5EF4-FFF2-40B4-BE49-F238E27FC236}">
+                <a16:creationId xmlns:a16="http://schemas.microsoft.com/office/drawing/2014/main" id="{5A302AB3-5BA3-4159-8A66-6AD187FB9AAE}"/>
+              </a:ext>
+            </a:extLst>
+          </p:cNvPr>
+          <p:cNvSpPr/>
+          <p:nvPr/>
+        </p:nvSpPr>
+        <p:spPr>
+          <a:xfrm rot="5400000">
+            <a:off x="8739164" y="4546940"/>
+            <a:ext cx="731602" cy="470517"/>
+          </a:xfrm>
+          <a:prstGeom prst="rightArrow">
+            <a:avLst/>
+          </a:prstGeom>
+        </p:spPr>
+        <p:style>
+          <a:lnRef idx="2">
+            <a:schemeClr val="accent2">
+              <a:shade val="50000"/>
+            </a:schemeClr>
+          </a:lnRef>
+          <a:fillRef idx="1">
+            <a:schemeClr val="accent2"/>
+          </a:fillRef>
+          <a:effectRef idx="0">
+            <a:schemeClr val="accent2"/>
+          </a:effectRef>
+          <a:fontRef idx="minor">
+            <a:schemeClr val="lt1"/>
+          </a:fontRef>
+        </p:style>
+        <p:txBody>
+          <a:bodyPr rtlCol="0" anchor="ctr"/>
+          <a:lstStyle/>
+          <a:p>
+            <a:pPr algn="ctr"/>
+            <a:endParaRPr lang="zh-CN" altLang="en-US"/>
+          </a:p>
+        </p:txBody>
+      </p:sp>
+      <p:sp>
+        <p:nvSpPr>
+          <p:cNvPr id="25" name="箭头: 右 24">
+            <a:extLst>
+              <a:ext uri="{FF2B5EF4-FFF2-40B4-BE49-F238E27FC236}">
+                <a16:creationId xmlns:a16="http://schemas.microsoft.com/office/drawing/2014/main" id="{AD01DBE0-E687-4406-B502-987C9AC84181}"/>
+              </a:ext>
+            </a:extLst>
+          </p:cNvPr>
+          <p:cNvSpPr/>
+          <p:nvPr/>
+        </p:nvSpPr>
+        <p:spPr>
+          <a:xfrm rot="5400000">
+            <a:off x="6941431" y="5619429"/>
+            <a:ext cx="994138" cy="470517"/>
+          </a:xfrm>
+          <a:prstGeom prst="rightArrow">
+            <a:avLst/>
+          </a:prstGeom>
+        </p:spPr>
+        <p:style>
+          <a:lnRef idx="2">
+            <a:schemeClr val="accent2">
+              <a:shade val="50000"/>
+            </a:schemeClr>
+          </a:lnRef>
+          <a:fillRef idx="1">
+            <a:schemeClr val="accent2"/>
+          </a:fillRef>
+          <a:effectRef idx="0">
+            <a:schemeClr val="accent2"/>
+          </a:effectRef>
+          <a:fontRef idx="minor">
+            <a:schemeClr val="lt1"/>
+          </a:fontRef>
+        </p:style>
+        <p:txBody>
+          <a:bodyPr rtlCol="0" anchor="ctr"/>
+          <a:lstStyle/>
+          <a:p>
+            <a:pPr algn="ctr"/>
+            <a:endParaRPr lang="zh-CN" altLang="en-US"/>
+          </a:p>
+        </p:txBody>
+      </p:sp>
+      <p:cxnSp>
+        <p:nvCxnSpPr>
+          <p:cNvPr id="12" name="连接符: 肘形 11">
+            <a:extLst>
+              <a:ext uri="{FF2B5EF4-FFF2-40B4-BE49-F238E27FC236}">
+                <a16:creationId xmlns:a16="http://schemas.microsoft.com/office/drawing/2014/main" id="{CB754D49-0515-4104-9129-1C11D6FBBE9C}"/>
+              </a:ext>
+            </a:extLst>
+          </p:cNvPr>
+          <p:cNvCxnSpPr>
+            <a:stCxn id="21" idx="2"/>
+            <a:endCxn id="24" idx="1"/>
+          </p:cNvCxnSpPr>
+          <p:nvPr/>
+        </p:nvCxnSpPr>
+        <p:spPr>
+          <a:xfrm rot="16200000" flipH="1">
+            <a:off x="3181022" y="3276224"/>
+            <a:ext cx="1741052" cy="2166387"/>
+          </a:xfrm>
+          <a:prstGeom prst="bentConnector2">
+            <a:avLst/>
+          </a:prstGeom>
+          <a:ln>
+            <a:tailEnd type="triangle"/>
+          </a:ln>
+        </p:spPr>
+        <p:style>
+          <a:lnRef idx="1">
+            <a:schemeClr val="accent1"/>
+          </a:lnRef>
+          <a:fillRef idx="0">
+            <a:schemeClr val="accent1"/>
+          </a:fillRef>
+          <a:effectRef idx="0">
+            <a:schemeClr val="accent1"/>
+          </a:effectRef>
+          <a:fontRef idx="minor">
+            <a:schemeClr val="tx1"/>
+          </a:fontRef>
+        </p:style>
+      </p:cxnSp>
+      <p:sp>
+        <p:nvSpPr>
+          <p:cNvPr id="13" name="文本框 12">
+            <a:extLst>
+              <a:ext uri="{FF2B5EF4-FFF2-40B4-BE49-F238E27FC236}">
+                <a16:creationId xmlns:a16="http://schemas.microsoft.com/office/drawing/2014/main" id="{F4C2EDA2-DF74-47E0-96F7-D0F2BF73FC18}"/>
+              </a:ext>
+            </a:extLst>
+          </p:cNvPr>
+          <p:cNvSpPr txBox="1"/>
+          <p:nvPr/>
+        </p:nvSpPr>
+        <p:spPr>
+          <a:xfrm>
+            <a:off x="1194418" y="4517392"/>
+            <a:ext cx="3153427" cy="646331"/>
+          </a:xfrm>
+          <a:prstGeom prst="rect">
+            <a:avLst/>
+          </a:prstGeom>
+          <a:noFill/>
+        </p:spPr>
+        <p:txBody>
+          <a:bodyPr wrap="none" rtlCol="0">
+            <a:spAutoFit/>
+          </a:bodyPr>
+          <a:lstStyle/>
+          <a:p>
+            <a:r>
+              <a:rPr lang="zh-CN" altLang="en-US" b="1" dirty="0"/>
+              <a:t>获取</a:t>
+            </a:r>
+            <a:r>
+              <a:rPr lang="en-US" altLang="zh-CN" b="1" dirty="0"/>
+              <a:t>SFC</a:t>
+            </a:r>
+            <a:r>
+              <a:rPr lang="zh-CN" altLang="en-US" b="1" dirty="0"/>
+              <a:t>的设置</a:t>
+            </a:r>
+            <a:endParaRPr lang="en-US" altLang="zh-CN" b="1" dirty="0"/>
+          </a:p>
+          <a:p>
+            <a:pPr marL="285750" indent="-285750">
+              <a:buFont typeface="Arial" panose="020B0604020202020204" pitchFamily="34" charset="0"/>
+              <a:buChar char="•"/>
+            </a:pPr>
+            <a:r>
+              <a:rPr lang="zh-CN" altLang="en-US" b="1" dirty="0"/>
+              <a:t>有些</a:t>
+            </a:r>
+            <a:r>
+              <a:rPr lang="en-US" altLang="zh-CN" b="1" dirty="0"/>
+              <a:t>SFC</a:t>
+            </a:r>
+            <a:r>
+              <a:rPr lang="zh-CN" altLang="en-US" b="1" dirty="0"/>
+              <a:t>不参与自适应调节</a:t>
+            </a:r>
+          </a:p>
+        </p:txBody>
+      </p:sp>
+      <p:sp>
+        <p:nvSpPr>
+          <p:cNvPr id="14" name="文本框 13">
+            <a:extLst>
+              <a:ext uri="{FF2B5EF4-FFF2-40B4-BE49-F238E27FC236}">
+                <a16:creationId xmlns:a16="http://schemas.microsoft.com/office/drawing/2014/main" id="{22A376D6-61F6-4CF9-B465-7963BE2EAF1E}"/>
+              </a:ext>
+            </a:extLst>
+          </p:cNvPr>
+          <p:cNvSpPr txBox="1"/>
+          <p:nvPr/>
+        </p:nvSpPr>
+        <p:spPr>
+          <a:xfrm>
+            <a:off x="6682718" y="4608585"/>
+            <a:ext cx="1502334" cy="369332"/>
+          </a:xfrm>
+          <a:prstGeom prst="rect">
+            <a:avLst/>
+          </a:prstGeom>
+          <a:noFill/>
+        </p:spPr>
+        <p:txBody>
+          <a:bodyPr wrap="none" rtlCol="0">
+            <a:spAutoFit/>
+          </a:bodyPr>
+          <a:lstStyle/>
+          <a:p>
+            <a:r>
+              <a:rPr lang="en-US" altLang="zh-CN" b="1" dirty="0" err="1"/>
+              <a:t>alertQueue</a:t>
+            </a:r>
+            <a:r>
+              <a:rPr lang="en-US" altLang="zh-CN" b="1" dirty="0"/>
+              <a:t>()</a:t>
+            </a:r>
+            <a:endParaRPr lang="zh-CN" altLang="en-US" b="1" dirty="0"/>
+          </a:p>
+        </p:txBody>
+      </p:sp>
+      <p:sp>
+        <p:nvSpPr>
+          <p:cNvPr id="28" name="矩形 27">
+            <a:extLst>
+              <a:ext uri="{FF2B5EF4-FFF2-40B4-BE49-F238E27FC236}">
+                <a16:creationId xmlns:a16="http://schemas.microsoft.com/office/drawing/2014/main" id="{C87AF13B-579A-4474-9754-15631C9E5D81}"/>
+              </a:ext>
+            </a:extLst>
+          </p:cNvPr>
+          <p:cNvSpPr/>
+          <p:nvPr/>
+        </p:nvSpPr>
+        <p:spPr>
+          <a:xfrm>
+            <a:off x="6434583" y="2846824"/>
+            <a:ext cx="2007831" cy="535762"/>
+          </a:xfrm>
+          <a:prstGeom prst="rect">
+            <a:avLst/>
+          </a:prstGeom>
+        </p:spPr>
+        <p:style>
+          <a:lnRef idx="2">
+            <a:schemeClr val="accent1">
+              <a:shade val="50000"/>
+            </a:schemeClr>
+          </a:lnRef>
+          <a:fillRef idx="1">
+            <a:schemeClr val="accent1"/>
+          </a:fillRef>
+          <a:effectRef idx="0">
+            <a:schemeClr val="accent1"/>
+          </a:effectRef>
+          <a:fontRef idx="minor">
+            <a:schemeClr val="lt1"/>
+          </a:fontRef>
+        </p:style>
+        <p:txBody>
+          <a:bodyPr rtlCol="0" anchor="ctr"/>
+          <a:lstStyle/>
+          <a:p>
+            <a:pPr algn="ctr"/>
+            <a:r>
+              <a:rPr lang="en-US" altLang="zh-CN" dirty="0"/>
+              <a:t>Retriever</a:t>
+            </a:r>
+            <a:endParaRPr lang="zh-CN" altLang="en-US" dirty="0"/>
+          </a:p>
+        </p:txBody>
+      </p:sp>
+      <p:sp>
+        <p:nvSpPr>
+          <p:cNvPr id="29" name="箭头: 右 28">
+            <a:extLst>
+              <a:ext uri="{FF2B5EF4-FFF2-40B4-BE49-F238E27FC236}">
+                <a16:creationId xmlns:a16="http://schemas.microsoft.com/office/drawing/2014/main" id="{8D7E8B7B-2093-46DE-B8DA-4BE8DBFF8570}"/>
+              </a:ext>
+            </a:extLst>
+          </p:cNvPr>
+          <p:cNvSpPr/>
+          <p:nvPr/>
+        </p:nvSpPr>
+        <p:spPr>
+          <a:xfrm rot="5400000">
+            <a:off x="7101780" y="2487718"/>
+            <a:ext cx="673434" cy="470517"/>
+          </a:xfrm>
+          <a:prstGeom prst="rightArrow">
+            <a:avLst/>
+          </a:prstGeom>
+        </p:spPr>
+        <p:style>
+          <a:lnRef idx="2">
+            <a:schemeClr val="accent2">
+              <a:shade val="50000"/>
+            </a:schemeClr>
+          </a:lnRef>
+          <a:fillRef idx="1">
+            <a:schemeClr val="accent2"/>
+          </a:fillRef>
+          <a:effectRef idx="0">
+            <a:schemeClr val="accent2"/>
+          </a:effectRef>
+          <a:fontRef idx="minor">
+            <a:schemeClr val="lt1"/>
+          </a:fontRef>
+        </p:style>
+        <p:txBody>
+          <a:bodyPr rtlCol="0" anchor="ctr"/>
+          <a:lstStyle/>
+          <a:p>
+            <a:pPr algn="ctr"/>
+            <a:endParaRPr lang="zh-CN" altLang="en-US"/>
+          </a:p>
+        </p:txBody>
+      </p:sp>
+      <p:sp>
+        <p:nvSpPr>
+          <p:cNvPr id="9" name="箭头: 右 8">
+            <a:extLst>
+              <a:ext uri="{FF2B5EF4-FFF2-40B4-BE49-F238E27FC236}">
+                <a16:creationId xmlns:a16="http://schemas.microsoft.com/office/drawing/2014/main" id="{2F585151-A179-46E0-9CC1-346AE0024840}"/>
+              </a:ext>
+            </a:extLst>
+          </p:cNvPr>
+          <p:cNvSpPr/>
+          <p:nvPr/>
+        </p:nvSpPr>
+        <p:spPr>
+          <a:xfrm rot="7984879">
+            <a:off x="6235729" y="3444859"/>
+            <a:ext cx="673433" cy="470517"/>
+          </a:xfrm>
+          <a:prstGeom prst="rightArrow">
+            <a:avLst/>
+          </a:prstGeom>
+        </p:spPr>
+        <p:style>
+          <a:lnRef idx="2">
+            <a:schemeClr val="accent2">
+              <a:shade val="50000"/>
+            </a:schemeClr>
+          </a:lnRef>
+          <a:fillRef idx="1">
+            <a:schemeClr val="accent2"/>
+          </a:fillRef>
+          <a:effectRef idx="0">
+            <a:schemeClr val="accent2"/>
+          </a:effectRef>
+          <a:fontRef idx="minor">
+            <a:schemeClr val="lt1"/>
+          </a:fontRef>
+        </p:style>
+        <p:txBody>
+          <a:bodyPr rtlCol="0" anchor="ctr"/>
+          <a:lstStyle/>
+          <a:p>
+            <a:pPr algn="ctr"/>
+            <a:endParaRPr lang="zh-CN" altLang="en-US"/>
+          </a:p>
+        </p:txBody>
+      </p:sp>
+      <p:sp>
+        <p:nvSpPr>
+          <p:cNvPr id="18" name="箭头: 右 17">
+            <a:extLst>
+              <a:ext uri="{FF2B5EF4-FFF2-40B4-BE49-F238E27FC236}">
+                <a16:creationId xmlns:a16="http://schemas.microsoft.com/office/drawing/2014/main" id="{68D9F58D-2BD7-4D16-A8DE-B5BE44BC429C}"/>
+              </a:ext>
+            </a:extLst>
+          </p:cNvPr>
+          <p:cNvSpPr/>
+          <p:nvPr/>
+        </p:nvSpPr>
+        <p:spPr>
+          <a:xfrm rot="2477406">
+            <a:off x="7911239" y="3374291"/>
+            <a:ext cx="673433" cy="470517"/>
+          </a:xfrm>
+          <a:prstGeom prst="rightArrow">
+            <a:avLst/>
+          </a:prstGeom>
+        </p:spPr>
+        <p:style>
+          <a:lnRef idx="2">
+            <a:schemeClr val="accent2">
+              <a:shade val="50000"/>
+            </a:schemeClr>
+          </a:lnRef>
+          <a:fillRef idx="1">
+            <a:schemeClr val="accent2"/>
+          </a:fillRef>
+          <a:effectRef idx="0">
+            <a:schemeClr val="accent2"/>
+          </a:effectRef>
+          <a:fontRef idx="minor">
+            <a:schemeClr val="lt1"/>
+          </a:fontRef>
+        </p:style>
+        <p:txBody>
+          <a:bodyPr rtlCol="0" anchor="ctr"/>
+          <a:lstStyle/>
+          <a:p>
+            <a:pPr algn="ctr"/>
+            <a:endParaRPr lang="zh-CN" altLang="en-US"/>
+          </a:p>
+        </p:txBody>
+      </p:sp>
+    </p:spTree>
+    <p:extLst>
+      <p:ext uri="{BB962C8B-B14F-4D97-AF65-F5344CB8AC3E}">
+        <p14:creationId xmlns:p14="http://schemas.microsoft.com/office/powerpoint/2010/main" val="3880209501"/>
+      </p:ext>
+    </p:extLst>
+  </p:cSld>
+  <p:clrMapOvr>
+    <a:masterClrMapping/>
+  </p:clrMapOvr>
+</p:sld>
+</file>
+
+<file path=ppt/slides/slide5.xml><?xml version="1.0" encoding="utf-8"?>
+<p:sld xmlns:a="http://schemas.openxmlformats.org/drawingml/2006/main" xmlns:r="http://schemas.openxmlformats.org/officeDocument/2006/relationships" xmlns:p="http://schemas.openxmlformats.org/presentationml/2006/main">
+  <p:cSld>
+    <p:spTree>
+      <p:nvGrpSpPr>
+        <p:cNvPr id="1" name=""/>
+        <p:cNvGrpSpPr/>
+        <p:nvPr/>
+      </p:nvGrpSpPr>
+      <p:grpSpPr>
+        <a:xfrm>
+          <a:off x="0" y="0"/>
+          <a:ext cx="0" cy="0"/>
+          <a:chOff x="0" y="0"/>
+          <a:chExt cx="0" cy="0"/>
+        </a:xfrm>
+      </p:grpSpPr>
+      <p:sp>
+        <p:nvSpPr>
+          <p:cNvPr id="2" name="标题 1">
+            <a:extLst>
+              <a:ext uri="{FF2B5EF4-FFF2-40B4-BE49-F238E27FC236}">
                 <a16:creationId xmlns:a16="http://schemas.microsoft.com/office/drawing/2014/main" id="{81E92E78-51F9-428B-B8A5-C6258E7DE9A7}"/>
               </a:ext>
             </a:extLst>
@@ -4207,10 +5000,60 @@
           <a:lstStyle/>
           <a:p>
             <a:r>
-              <a:rPr lang="zh-CN" altLang="en-US"/>
-              <a:t>用户可以选择弹性扩容模式</a:t>
-            </a:r>
-            <a:endParaRPr lang="zh-CN" altLang="en-US" dirty="0"/>
+              <a:rPr lang="zh-CN" altLang="en-US" dirty="0"/>
+              <a:t>用户可以选择弹性扩容模式和故障恢复模式</a:t>
+            </a:r>
+            <a:endParaRPr lang="en-US" altLang="zh-CN" dirty="0"/>
+          </a:p>
+          <a:p>
+            <a:pPr lvl="1"/>
+            <a:r>
+              <a:rPr lang="en-US" altLang="zh-CN" dirty="0"/>
+              <a:t>Manual</a:t>
+            </a:r>
+            <a:r>
+              <a:rPr lang="zh-CN" altLang="en-US" dirty="0"/>
+              <a:t>，此时</a:t>
+            </a:r>
+            <a:r>
+              <a:rPr lang="en-US" altLang="zh-CN" dirty="0"/>
+              <a:t>Adaptive</a:t>
+            </a:r>
+            <a:r>
+              <a:rPr lang="zh-CN" altLang="en-US" dirty="0"/>
+              <a:t>忽略这个</a:t>
+            </a:r>
+            <a:r>
+              <a:rPr lang="en-US" altLang="zh-CN" dirty="0"/>
+              <a:t>SFC</a:t>
+            </a:r>
+          </a:p>
+          <a:p>
+            <a:pPr lvl="1"/>
+            <a:r>
+              <a:rPr lang="en-US" altLang="zh-CN" dirty="0"/>
+              <a:t>Auto</a:t>
+            </a:r>
+            <a:r>
+              <a:rPr lang="zh-CN" altLang="en-US" dirty="0"/>
+              <a:t>，</a:t>
+            </a:r>
+            <a:r>
+              <a:rPr lang="en-US" altLang="zh-CN" dirty="0"/>
+              <a:t>Adaptive</a:t>
+            </a:r>
+            <a:r>
+              <a:rPr lang="zh-CN" altLang="en-US" dirty="0"/>
+              <a:t>对这类</a:t>
+            </a:r>
+            <a:r>
+              <a:rPr lang="en-US" altLang="zh-CN" dirty="0"/>
+              <a:t>SFC</a:t>
+            </a:r>
+            <a:r>
+              <a:rPr lang="zh-CN" altLang="en-US" dirty="0"/>
+              <a:t>实行自动弹性扩缩容和自动故障恢复</a:t>
+            </a:r>
           </a:p>
         </p:txBody>
       </p:sp>
@@ -4218,6 +5061,419 @@
     <p:extLst>
       <p:ext uri="{BB962C8B-B14F-4D97-AF65-F5344CB8AC3E}">
         <p14:creationId xmlns:p14="http://schemas.microsoft.com/office/powerpoint/2010/main" val="3065987614"/>
+      </p:ext>
+    </p:extLst>
+  </p:cSld>
+  <p:clrMapOvr>
+    <a:masterClrMapping/>
+  </p:clrMapOvr>
+</p:sld>
+</file>
+
+<file path=ppt/slides/slide6.xml><?xml version="1.0" encoding="utf-8"?>
+<p:sld xmlns:a="http://schemas.openxmlformats.org/drawingml/2006/main" xmlns:r="http://schemas.openxmlformats.org/officeDocument/2006/relationships" xmlns:p="http://schemas.openxmlformats.org/presentationml/2006/main">
+  <p:cSld>
+    <p:spTree>
+      <p:nvGrpSpPr>
+        <p:cNvPr id="1" name=""/>
+        <p:cNvGrpSpPr/>
+        <p:nvPr/>
+      </p:nvGrpSpPr>
+      <p:grpSpPr>
+        <a:xfrm>
+          <a:off x="0" y="0"/>
+          <a:ext cx="0" cy="0"/>
+          <a:chOff x="0" y="0"/>
+          <a:chExt cx="0" cy="0"/>
+        </a:xfrm>
+      </p:grpSpPr>
+      <p:sp>
+        <p:nvSpPr>
+          <p:cNvPr id="2" name="标题 1">
+            <a:extLst>
+              <a:ext uri="{FF2B5EF4-FFF2-40B4-BE49-F238E27FC236}">
+                <a16:creationId xmlns:a16="http://schemas.microsoft.com/office/drawing/2014/main" id="{051A1879-E7DF-4A9A-A2C6-06E0A7D2EB38}"/>
+              </a:ext>
+            </a:extLst>
+          </p:cNvPr>
+          <p:cNvSpPr>
+            <a:spLocks noGrp="1"/>
+          </p:cNvSpPr>
+          <p:nvPr>
+            <p:ph type="title"/>
+          </p:nvPr>
+        </p:nvSpPr>
+        <p:spPr/>
+        <p:txBody>
+          <a:bodyPr/>
+          <a:lstStyle/>
+          <a:p>
+            <a:r>
+              <a:rPr lang="zh-CN" altLang="en-US" dirty="0"/>
+              <a:t>代码细节</a:t>
+            </a:r>
+          </a:p>
+        </p:txBody>
+      </p:sp>
+      <p:sp>
+        <p:nvSpPr>
+          <p:cNvPr id="3" name="内容占位符 2">
+            <a:extLst>
+              <a:ext uri="{FF2B5EF4-FFF2-40B4-BE49-F238E27FC236}">
+                <a16:creationId xmlns:a16="http://schemas.microsoft.com/office/drawing/2014/main" id="{B483854A-B5F8-4AF4-ACC6-33206905ABC4}"/>
+              </a:ext>
+            </a:extLst>
+          </p:cNvPr>
+          <p:cNvSpPr>
+            <a:spLocks noGrp="1"/>
+          </p:cNvSpPr>
+          <p:nvPr>
+            <p:ph idx="1"/>
+          </p:nvPr>
+        </p:nvSpPr>
+        <p:spPr/>
+        <p:txBody>
+          <a:bodyPr/>
+          <a:lstStyle/>
+          <a:p>
+            <a:r>
+              <a:rPr lang="en-US" altLang="zh-CN" dirty="0"/>
+              <a:t>If </a:t>
+            </a:r>
+            <a:r>
+              <a:rPr lang="en-US" altLang="zh-CN" dirty="0" err="1"/>
+              <a:t>canProtect</a:t>
+            </a:r>
+            <a:r>
+              <a:rPr lang="en-US" altLang="zh-CN" dirty="0"/>
+              <a:t>()</a:t>
+            </a:r>
+          </a:p>
+          <a:p>
+            <a:pPr lvl="1"/>
+            <a:r>
+              <a:rPr lang="en-US" altLang="zh-CN" dirty="0"/>
+              <a:t>Do </a:t>
+            </a:r>
+            <a:r>
+              <a:rPr lang="en-US" altLang="zh-CN" dirty="0" err="1"/>
+              <a:t>sth</a:t>
+            </a:r>
+            <a:r>
+              <a:rPr lang="en-US" altLang="zh-CN" dirty="0"/>
+              <a:t>.</a:t>
+            </a:r>
+          </a:p>
+          <a:p>
+            <a:pPr lvl="1"/>
+            <a:r>
+              <a:rPr lang="en-US" altLang="zh-CN" dirty="0"/>
+              <a:t>Set </a:t>
+            </a:r>
+            <a:r>
+              <a:rPr lang="en-US" altLang="zh-CN" dirty="0" err="1"/>
+              <a:t>sfci</a:t>
+            </a:r>
+            <a:r>
+              <a:rPr lang="en-US" altLang="zh-CN" dirty="0"/>
+              <a:t> state to STATE_PROTECTION_MODE</a:t>
+            </a:r>
+          </a:p>
+          <a:p>
+            <a:r>
+              <a:rPr lang="en-US" altLang="zh-CN" dirty="0" err="1"/>
+              <a:t>ElIf</a:t>
+            </a:r>
+            <a:r>
+              <a:rPr lang="en-US" altLang="zh-CN" dirty="0"/>
+              <a:t> </a:t>
+            </a:r>
+            <a:r>
+              <a:rPr lang="en-US" altLang="zh-CN" dirty="0" err="1"/>
+              <a:t>canRecovery</a:t>
+            </a:r>
+            <a:r>
+              <a:rPr lang="en-US" altLang="zh-CN" dirty="0"/>
+              <a:t>()</a:t>
+            </a:r>
+          </a:p>
+          <a:p>
+            <a:pPr lvl="1"/>
+            <a:r>
+              <a:rPr lang="en-US" altLang="zh-CN" dirty="0"/>
+              <a:t>Do </a:t>
+            </a:r>
+            <a:r>
+              <a:rPr lang="en-US" altLang="zh-CN" dirty="0" err="1"/>
+              <a:t>sth</a:t>
+            </a:r>
+            <a:r>
+              <a:rPr lang="en-US" altLang="zh-CN" dirty="0"/>
+              <a:t>.</a:t>
+            </a:r>
+          </a:p>
+          <a:p>
+            <a:pPr marL="457200" lvl="1" indent="0">
+              <a:buNone/>
+            </a:pPr>
+            <a:endParaRPr lang="en-US" altLang="zh-CN" dirty="0"/>
+          </a:p>
+          <a:p>
+            <a:r>
+              <a:rPr lang="en-US" altLang="zh-CN" dirty="0"/>
+              <a:t>Def </a:t>
+            </a:r>
+            <a:r>
+              <a:rPr lang="en-US" altLang="zh-CN" dirty="0" err="1"/>
+              <a:t>canProtect</a:t>
+            </a:r>
+            <a:r>
+              <a:rPr lang="en-US" altLang="zh-CN" dirty="0"/>
+              <a:t>()</a:t>
+            </a:r>
+          </a:p>
+          <a:p>
+            <a:pPr lvl="1"/>
+            <a:r>
+              <a:rPr lang="en-US" altLang="zh-CN" dirty="0"/>
+              <a:t>If </a:t>
+            </a:r>
+            <a:r>
+              <a:rPr lang="en-US" altLang="zh-CN" dirty="0" err="1"/>
+              <a:t>sfci</a:t>
+            </a:r>
+            <a:r>
+              <a:rPr lang="en-US" altLang="zh-CN" dirty="0"/>
+              <a:t> state is STATE_PROTECTION_MODE, can’t be protected again!</a:t>
+            </a:r>
+          </a:p>
+          <a:p>
+            <a:pPr lvl="2"/>
+            <a:r>
+              <a:rPr lang="en-US" altLang="zh-CN" dirty="0"/>
+              <a:t>Return false</a:t>
+            </a:r>
+          </a:p>
+        </p:txBody>
+      </p:sp>
+    </p:spTree>
+    <p:extLst>
+      <p:ext uri="{BB962C8B-B14F-4D97-AF65-F5344CB8AC3E}">
+        <p14:creationId xmlns:p14="http://schemas.microsoft.com/office/powerpoint/2010/main" val="745915393"/>
+      </p:ext>
+    </p:extLst>
+  </p:cSld>
+  <p:clrMapOvr>
+    <a:masterClrMapping/>
+  </p:clrMapOvr>
+</p:sld>
+</file>
+
+<file path=ppt/slides/slide7.xml><?xml version="1.0" encoding="utf-8"?>
+<p:sld xmlns:a="http://schemas.openxmlformats.org/drawingml/2006/main" xmlns:r="http://schemas.openxmlformats.org/officeDocument/2006/relationships" xmlns:p="http://schemas.openxmlformats.org/presentationml/2006/main">
+  <p:cSld>
+    <p:spTree>
+      <p:nvGrpSpPr>
+        <p:cNvPr id="1" name=""/>
+        <p:cNvGrpSpPr/>
+        <p:nvPr/>
+      </p:nvGrpSpPr>
+      <p:grpSpPr>
+        <a:xfrm>
+          <a:off x="0" y="0"/>
+          <a:ext cx="0" cy="0"/>
+          <a:chOff x="0" y="0"/>
+          <a:chExt cx="0" cy="0"/>
+        </a:xfrm>
+      </p:grpSpPr>
+      <p:sp>
+        <p:nvSpPr>
+          <p:cNvPr id="2" name="标题 1">
+            <a:extLst>
+              <a:ext uri="{FF2B5EF4-FFF2-40B4-BE49-F238E27FC236}">
+                <a16:creationId xmlns:a16="http://schemas.microsoft.com/office/drawing/2014/main" id="{92EF8300-7E94-432A-953A-885C15A01046}"/>
+              </a:ext>
+            </a:extLst>
+          </p:cNvPr>
+          <p:cNvSpPr>
+            <a:spLocks noGrp="1"/>
+          </p:cNvSpPr>
+          <p:nvPr>
+            <p:ph type="title"/>
+          </p:nvPr>
+        </p:nvSpPr>
+        <p:spPr/>
+        <p:txBody>
+          <a:bodyPr/>
+          <a:lstStyle/>
+          <a:p>
+            <a:r>
+              <a:rPr lang="zh-CN" altLang="en-US" dirty="0"/>
+              <a:t>代码细节</a:t>
+            </a:r>
+          </a:p>
+        </p:txBody>
+      </p:sp>
+      <p:sp>
+        <p:nvSpPr>
+          <p:cNvPr id="3" name="内容占位符 2">
+            <a:extLst>
+              <a:ext uri="{FF2B5EF4-FFF2-40B4-BE49-F238E27FC236}">
+                <a16:creationId xmlns:a16="http://schemas.microsoft.com/office/drawing/2014/main" id="{47F2C312-8292-4332-AE22-A7AA76CB1E36}"/>
+              </a:ext>
+            </a:extLst>
+          </p:cNvPr>
+          <p:cNvSpPr>
+            <a:spLocks noGrp="1"/>
+          </p:cNvSpPr>
+          <p:nvPr>
+            <p:ph idx="1"/>
+          </p:nvPr>
+        </p:nvSpPr>
+        <p:spPr/>
+        <p:txBody>
+          <a:bodyPr/>
+          <a:lstStyle/>
+          <a:p>
+            <a:r>
+              <a:rPr lang="en-US" altLang="zh-CN" dirty="0"/>
+              <a:t>Flow</a:t>
+            </a:r>
+            <a:r>
+              <a:rPr lang="zh-CN" altLang="en-US" dirty="0"/>
+              <a:t>和</a:t>
+            </a:r>
+            <a:r>
+              <a:rPr lang="en-US" altLang="zh-CN" dirty="0"/>
+              <a:t>SFCI</a:t>
+            </a:r>
+            <a:r>
+              <a:rPr lang="zh-CN" altLang="en-US" dirty="0"/>
+              <a:t>的映射器类</a:t>
+            </a:r>
+            <a:endParaRPr lang="en-US" altLang="zh-CN" dirty="0"/>
+          </a:p>
+          <a:p>
+            <a:r>
+              <a:rPr lang="en-US" altLang="zh-CN" dirty="0"/>
+              <a:t>Class </a:t>
+            </a:r>
+            <a:r>
+              <a:rPr lang="en-US" altLang="zh-CN" dirty="0" err="1"/>
+              <a:t>FlowSFCIMapper</a:t>
+            </a:r>
+            <a:r>
+              <a:rPr lang="en-US" altLang="zh-CN" dirty="0"/>
+              <a:t>(object)</a:t>
+            </a:r>
+          </a:p>
+          <a:p>
+            <a:pPr lvl="1"/>
+            <a:r>
+              <a:rPr lang="en-US" altLang="zh-CN" dirty="0"/>
+              <a:t>def </a:t>
+            </a:r>
+            <a:r>
+              <a:rPr lang="en-US" altLang="zh-CN" dirty="0" err="1"/>
+              <a:t>getSFCIByFlow</a:t>
+            </a:r>
+            <a:r>
+              <a:rPr lang="en-US" altLang="zh-CN" dirty="0"/>
+              <a:t>(self, </a:t>
+            </a:r>
+            <a:r>
+              <a:rPr lang="en-US" altLang="zh-CN" dirty="0" err="1"/>
+              <a:t>flowIdentifier</a:t>
+            </a:r>
+            <a:r>
+              <a:rPr lang="en-US" altLang="zh-CN" dirty="0"/>
+              <a:t>)</a:t>
+            </a:r>
+          </a:p>
+          <a:p>
+            <a:pPr lvl="2"/>
+            <a:r>
+              <a:rPr lang="en-US" altLang="zh-CN" dirty="0"/>
+              <a:t>#</a:t>
+            </a:r>
+            <a:r>
+              <a:rPr lang="zh-CN" altLang="en-US" dirty="0"/>
+              <a:t>根据</a:t>
+            </a:r>
+            <a:r>
+              <a:rPr lang="en-US" altLang="zh-CN" dirty="0"/>
+              <a:t>flow</a:t>
+            </a:r>
+            <a:r>
+              <a:rPr lang="zh-CN" altLang="en-US" dirty="0"/>
+              <a:t>的标识符，查找其对应的</a:t>
+            </a:r>
+            <a:r>
+              <a:rPr lang="en-US" altLang="zh-CN" dirty="0"/>
+              <a:t>SFCI</a:t>
+            </a:r>
+          </a:p>
+          <a:p>
+            <a:pPr lvl="1"/>
+            <a:r>
+              <a:rPr lang="en-US" altLang="zh-CN" dirty="0"/>
+              <a:t>def </a:t>
+            </a:r>
+            <a:r>
+              <a:rPr lang="en-US" altLang="zh-CN" dirty="0" err="1"/>
+              <a:t>getFlowBySFCI</a:t>
+            </a:r>
+            <a:r>
+              <a:rPr lang="en-US" altLang="zh-CN" dirty="0"/>
+              <a:t>(self, </a:t>
+            </a:r>
+            <a:r>
+              <a:rPr lang="en-US" altLang="zh-CN" dirty="0" err="1"/>
+              <a:t>sfciID</a:t>
+            </a:r>
+            <a:r>
+              <a:rPr lang="en-US" altLang="zh-CN" dirty="0"/>
+              <a:t>)</a:t>
+            </a:r>
+          </a:p>
+          <a:p>
+            <a:pPr lvl="2"/>
+            <a:r>
+              <a:rPr lang="en-US" altLang="zh-CN" dirty="0"/>
+              <a:t># </a:t>
+            </a:r>
+            <a:r>
+              <a:rPr lang="zh-CN" altLang="en-US" dirty="0"/>
+              <a:t>根据</a:t>
+            </a:r>
+            <a:r>
+              <a:rPr lang="en-US" altLang="zh-CN" dirty="0" err="1"/>
+              <a:t>sfciID</a:t>
+            </a:r>
+            <a:r>
+              <a:rPr lang="zh-CN" altLang="en-US" dirty="0"/>
+              <a:t>，查找该</a:t>
+            </a:r>
+            <a:r>
+              <a:rPr lang="en-US" altLang="zh-CN" dirty="0" err="1"/>
+              <a:t>sfci</a:t>
+            </a:r>
+            <a:r>
+              <a:rPr lang="zh-CN" altLang="en-US" dirty="0"/>
+              <a:t>的所有</a:t>
+            </a:r>
+            <a:r>
+              <a:rPr lang="en-US" altLang="zh-CN" dirty="0"/>
+              <a:t>flow identifier</a:t>
+            </a:r>
+            <a:endParaRPr lang="zh-CN" altLang="en-US" dirty="0"/>
+          </a:p>
+        </p:txBody>
+      </p:sp>
+    </p:spTree>
+    <p:extLst>
+      <p:ext uri="{BB962C8B-B14F-4D97-AF65-F5344CB8AC3E}">
+        <p14:creationId xmlns:p14="http://schemas.microsoft.com/office/powerpoint/2010/main" val="1351535658"/>
       </p:ext>
     </p:extLst>
   </p:cSld>

</xml_diff>